<commit_message>
update iops 2015 winter poster
</commit_message>
<xml_diff>
--- a/2015_2016/20151210 iops winter conference/tgtbf poster.pptx
+++ b/2015_2016/20151210 iops winter conference/tgtbf poster.pptx
@@ -197,7 +197,7 @@
           <a:p>
             <a:fld id="{52C5248B-B6AF-4661-95D0-95E56E789FE3}" type="datetimeFigureOut">
               <a:rPr lang="en-US" smtClean="0"/>
-              <a:t>11/25/2015</a:t>
+              <a:t>12/1/2015</a:t>
             </a:fld>
             <a:endParaRPr lang="en-US"/>
           </a:p>
@@ -1633,7 +1633,7 @@
           <a:p>
             <a:fld id="{4AAD347D-5ACD-4C99-B74B-A9C85AD731AF}" type="datetimeFigureOut">
               <a:rPr lang="en-US" smtClean="0"/>
-              <a:t>11/25/2015</a:t>
+              <a:t>12/1/2015</a:t>
             </a:fld>
             <a:endParaRPr lang="en-US" dirty="0"/>
           </a:p>
@@ -1908,7 +1908,7 @@
           <a:p>
             <a:fld id="{4509A250-FF31-4206-8172-F9D3106AACB1}" type="datetimeFigureOut">
               <a:rPr lang="en-US" smtClean="0"/>
-              <a:t>11/25/2015</a:t>
+              <a:t>12/1/2015</a:t>
             </a:fld>
             <a:endParaRPr lang="en-US" dirty="0"/>
           </a:p>
@@ -2102,7 +2102,7 @@
           <a:p>
             <a:fld id="{4509A250-FF31-4206-8172-F9D3106AACB1}" type="datetimeFigureOut">
               <a:rPr lang="en-US" smtClean="0"/>
-              <a:t>11/25/2015</a:t>
+              <a:t>12/1/2015</a:t>
             </a:fld>
             <a:endParaRPr lang="en-US" dirty="0"/>
           </a:p>
@@ -2375,7 +2375,7 @@
           <a:p>
             <a:fld id="{4509A250-FF31-4206-8172-F9D3106AACB1}" type="datetimeFigureOut">
               <a:rPr lang="en-US" smtClean="0"/>
-              <a:t>11/25/2015</a:t>
+              <a:t>12/1/2015</a:t>
             </a:fld>
             <a:endParaRPr lang="en-US" dirty="0"/>
           </a:p>
@@ -2716,7 +2716,7 @@
           <a:p>
             <a:fld id="{4509A250-FF31-4206-8172-F9D3106AACB1}" type="datetimeFigureOut">
               <a:rPr lang="en-US" smtClean="0"/>
-              <a:t>11/25/2015</a:t>
+              <a:t>12/1/2015</a:t>
             </a:fld>
             <a:endParaRPr lang="en-US" dirty="0"/>
           </a:p>
@@ -3339,7 +3339,7 @@
           <a:p>
             <a:fld id="{4509A250-FF31-4206-8172-F9D3106AACB1}" type="datetimeFigureOut">
               <a:rPr lang="en-US" smtClean="0"/>
-              <a:t>11/25/2015</a:t>
+              <a:t>12/1/2015</a:t>
             </a:fld>
             <a:endParaRPr lang="en-US" dirty="0"/>
           </a:p>
@@ -4199,7 +4199,7 @@
           <a:p>
             <a:fld id="{4509A250-FF31-4206-8172-F9D3106AACB1}" type="datetimeFigureOut">
               <a:rPr lang="en-US" smtClean="0"/>
-              <a:t>11/25/2015</a:t>
+              <a:t>12/1/2015</a:t>
             </a:fld>
             <a:endParaRPr lang="en-US" dirty="0"/>
           </a:p>
@@ -4369,7 +4369,7 @@
           <a:p>
             <a:fld id="{4509A250-FF31-4206-8172-F9D3106AACB1}" type="datetimeFigureOut">
               <a:rPr lang="en-US" smtClean="0"/>
-              <a:t>11/25/2015</a:t>
+              <a:t>12/1/2015</a:t>
             </a:fld>
             <a:endParaRPr lang="en-US" dirty="0"/>
           </a:p>
@@ -4549,7 +4549,7 @@
           <a:p>
             <a:fld id="{4509A250-FF31-4206-8172-F9D3106AACB1}" type="datetimeFigureOut">
               <a:rPr lang="en-US" smtClean="0"/>
-              <a:t>11/25/2015</a:t>
+              <a:t>12/1/2015</a:t>
             </a:fld>
             <a:endParaRPr lang="en-US" dirty="0"/>
           </a:p>
@@ -4719,7 +4719,7 @@
           <a:p>
             <a:fld id="{4509A250-FF31-4206-8172-F9D3106AACB1}" type="datetimeFigureOut">
               <a:rPr lang="en-US" smtClean="0"/>
-              <a:t>11/25/2015</a:t>
+              <a:t>12/1/2015</a:t>
             </a:fld>
             <a:endParaRPr lang="en-US" dirty="0"/>
           </a:p>
@@ -4966,7 +4966,7 @@
           <a:p>
             <a:fld id="{9796027F-7875-4030-9381-8BD8C4F21935}" type="datetimeFigureOut">
               <a:rPr lang="en-US" smtClean="0"/>
-              <a:t>11/25/2015</a:t>
+              <a:t>12/1/2015</a:t>
             </a:fld>
             <a:endParaRPr lang="en-US" dirty="0"/>
           </a:p>
@@ -5258,7 +5258,7 @@
           <a:p>
             <a:fld id="{9796027F-7875-4030-9381-8BD8C4F21935}" type="datetimeFigureOut">
               <a:rPr lang="en-US" smtClean="0"/>
-              <a:t>11/25/2015</a:t>
+              <a:t>12/1/2015</a:t>
             </a:fld>
             <a:endParaRPr lang="en-US" dirty="0"/>
           </a:p>
@@ -5702,7 +5702,7 @@
           <a:p>
             <a:fld id="{9796027F-7875-4030-9381-8BD8C4F21935}" type="datetimeFigureOut">
               <a:rPr lang="en-US" smtClean="0"/>
-              <a:t>11/25/2015</a:t>
+              <a:t>12/1/2015</a:t>
             </a:fld>
             <a:endParaRPr lang="en-US" dirty="0"/>
           </a:p>
@@ -5820,7 +5820,7 @@
           <a:p>
             <a:fld id="{4509A250-FF31-4206-8172-F9D3106AACB1}" type="datetimeFigureOut">
               <a:rPr lang="en-US" smtClean="0"/>
-              <a:t>11/25/2015</a:t>
+              <a:t>12/1/2015</a:t>
             </a:fld>
             <a:endParaRPr lang="en-US" dirty="0"/>
           </a:p>
@@ -5915,7 +5915,7 @@
           <a:p>
             <a:fld id="{4509A250-FF31-4206-8172-F9D3106AACB1}" type="datetimeFigureOut">
               <a:rPr lang="en-US" smtClean="0"/>
-              <a:t>11/25/2015</a:t>
+              <a:t>12/1/2015</a:t>
             </a:fld>
             <a:endParaRPr lang="en-US" dirty="0"/>
           </a:p>
@@ -6194,7 +6194,7 @@
           <a:p>
             <a:fld id="{4509A250-FF31-4206-8172-F9D3106AACB1}" type="datetimeFigureOut">
               <a:rPr lang="en-US" smtClean="0"/>
-              <a:t>11/25/2015</a:t>
+              <a:t>12/1/2015</a:t>
             </a:fld>
             <a:endParaRPr lang="en-US" dirty="0"/>
           </a:p>
@@ -6469,7 +6469,7 @@
           <a:p>
             <a:fld id="{4509A250-FF31-4206-8172-F9D3106AACB1}" type="datetimeFigureOut">
               <a:rPr lang="en-US" smtClean="0"/>
-              <a:t>11/25/2015</a:t>
+              <a:t>12/1/2015</a:t>
             </a:fld>
             <a:endParaRPr lang="en-US" dirty="0"/>
           </a:p>
@@ -7034,7 +7034,7 @@
           <a:p>
             <a:fld id="{4AAD347D-5ACD-4C99-B74B-A9C85AD731AF}" type="datetimeFigureOut">
               <a:rPr lang="en-US" smtClean="0"/>
-              <a:t>11/25/2015</a:t>
+              <a:t>12/1/2015</a:t>
             </a:fld>
             <a:endParaRPr lang="en-US" dirty="0"/>
           </a:p>
@@ -7571,8 +7571,8 @@
         </p:nvSpPr>
         <p:spPr>
           <a:xfrm>
-            <a:off x="0" y="38345806"/>
-            <a:ext cx="30376814" cy="4457957"/>
+            <a:off x="0" y="38823900"/>
+            <a:ext cx="30376814" cy="3979863"/>
           </a:xfrm>
           <a:prstGeom prst="rect">
             <a:avLst/>
@@ -7671,19 +7671,7 @@
               <a:rPr lang="en-US" sz="5600" dirty="0" smtClean="0">
                 <a:latin typeface="Gill Sans MT" panose="020B0502020104020203" pitchFamily="34" charset="0"/>
               </a:rPr>
-              <a:t>Chris HJ Hartgerink</a:t>
-            </a:r>
-            <a:r>
-              <a:rPr lang="en-US" sz="5600" dirty="0" smtClean="0">
-                <a:latin typeface="Gill Sans MT" panose="020B0502020104020203" pitchFamily="34" charset="0"/>
-              </a:rPr>
-              <a:t>, </a:t>
-            </a:r>
-            <a:r>
-              <a:rPr lang="en-US" sz="5600" dirty="0" smtClean="0">
-                <a:latin typeface="Gill Sans MT" panose="020B0502020104020203" pitchFamily="34" charset="0"/>
-              </a:rPr>
-              <a:t>Jelte M </a:t>
+              <a:t>Chris HJ Hartgerink, Jelte M </a:t>
             </a:r>
             <a:r>
               <a:rPr lang="en-US" sz="5600" dirty="0">
@@ -7746,16 +7734,23 @@
         </p:nvSpPr>
         <p:spPr>
           <a:xfrm>
-            <a:off x="955638" y="3610732"/>
-            <a:ext cx="11720539" cy="9017853"/>
+            <a:off x="881058" y="3669166"/>
+            <a:ext cx="13779596" cy="17646503"/>
           </a:xfrm>
           <a:prstGeom prst="rect">
             <a:avLst/>
           </a:prstGeom>
-          <a:noFill/>
+          <a:solidFill>
+            <a:schemeClr val="tx1"/>
+          </a:solidFill>
+          <a:ln>
+            <a:solidFill>
+              <a:schemeClr val="bg1"/>
+            </a:solidFill>
+          </a:ln>
         </p:spPr>
         <p:txBody>
-          <a:bodyPr wrap="square" rtlCol="0">
+          <a:bodyPr wrap="square" lIns="108000" tIns="396000" rIns="1080000" bIns="72000" numCol="1" rtlCol="0">
             <a:spAutoFit/>
           </a:bodyPr>
           <a:lstStyle/>
@@ -7763,135 +7758,282 @@
             <a:pPr algn="ctr"/>
             <a:r>
               <a:rPr lang="en-US" sz="6000" dirty="0" smtClean="0">
+                <a:solidFill>
+                  <a:schemeClr val="bg1"/>
+                </a:solidFill>
                 <a:latin typeface="Gill Sans MT" panose="020B0502020104020203" pitchFamily="34" charset="0"/>
               </a:rPr>
               <a:t>Highlights</a:t>
             </a:r>
             <a:endParaRPr lang="en-US" sz="3600" dirty="0">
+              <a:solidFill>
+                <a:schemeClr val="bg1"/>
+              </a:solidFill>
               <a:latin typeface="Gill Sans MT" panose="020B0502020104020203" pitchFamily="34" charset="0"/>
             </a:endParaRPr>
           </a:p>
           <a:p>
-            <a:pPr marL="1143000" indent="-1143000" algn="just">
+            <a:pPr marL="990600" indent="-457200" algn="just">
               <a:buFont typeface="Arial" panose="020B0604020202020204" pitchFamily="34" charset="0"/>
               <a:buChar char="•"/>
             </a:pPr>
             <a:r>
-              <a:rPr lang="en-US" sz="4000" dirty="0" smtClean="0">
+              <a:rPr lang="en-US" sz="4800" dirty="0" smtClean="0">
+                <a:solidFill>
+                  <a:schemeClr val="bg1"/>
+                </a:solidFill>
                 <a:latin typeface="Gill Sans MT" panose="020B0502020104020203" pitchFamily="34" charset="0"/>
               </a:rPr>
-              <a:t>Relatively more </a:t>
-            </a:r>
-            <a:r>
-              <a:rPr lang="en-US" sz="4000" dirty="0" smtClean="0">
-                <a:latin typeface="Gill Sans MT" panose="020B0502020104020203" pitchFamily="34" charset="0"/>
-              </a:rPr>
-              <a:t>nonsignificant </a:t>
-            </a:r>
-            <a:r>
-              <a:rPr lang="en-US" sz="4000" dirty="0">
+              <a:t>Relatively more nonsignificant </a:t>
+            </a:r>
+            <a:r>
+              <a:rPr lang="en-US" sz="4800" dirty="0">
+                <a:solidFill>
+                  <a:schemeClr val="bg1"/>
+                </a:solidFill>
                 <a:latin typeface="Gill Sans MT" panose="020B0502020104020203" pitchFamily="34" charset="0"/>
               </a:rPr>
               <a:t>results are reported in psychology papers now than </a:t>
             </a:r>
             <a:r>
-              <a:rPr lang="en-US" sz="4000" dirty="0" smtClean="0">
+              <a:rPr lang="en-US" sz="4800" dirty="0" smtClean="0">
+                <a:solidFill>
+                  <a:schemeClr val="bg1"/>
+                </a:solidFill>
                 <a:latin typeface="Gill Sans MT" panose="020B0502020104020203" pitchFamily="34" charset="0"/>
               </a:rPr>
               <a:t>in 1985</a:t>
             </a:r>
-            <a:endParaRPr lang="en-US" sz="4000" dirty="0">
+            <a:endParaRPr lang="en-US" sz="4800" dirty="0">
+              <a:solidFill>
+                <a:schemeClr val="bg1"/>
+              </a:solidFill>
               <a:latin typeface="Gill Sans MT" panose="020B0502020104020203" pitchFamily="34" charset="0"/>
             </a:endParaRPr>
           </a:p>
           <a:p>
-            <a:pPr marL="1143000" indent="-1143000" algn="just">
+            <a:pPr marL="990600" indent="-457200" algn="just" defTabSz="179388">
               <a:buFont typeface="Arial" panose="020B0604020202020204" pitchFamily="34" charset="0"/>
               <a:buChar char="•"/>
             </a:pPr>
             <a:r>
-              <a:rPr lang="en-US" sz="4000" dirty="0" smtClean="0">
+              <a:rPr lang="en-US" sz="4800" dirty="0" smtClean="0">
+                <a:solidFill>
+                  <a:schemeClr val="bg1"/>
+                </a:solidFill>
                 <a:latin typeface="Gill Sans MT" panose="020B0502020104020203" pitchFamily="34" charset="0"/>
               </a:rPr>
-              <a:t>Fisher test is a powerful method to detect presence of false negatives among nonsignificant </a:t>
-            </a:r>
-            <a:r>
-              <a:rPr lang="en-US" sz="4000" i="1" dirty="0" smtClean="0">
+              <a:t>How many papers reporting nonsignificant results contain evidence for ≥1 false negative?</a:t>
+            </a:r>
+          </a:p>
+          <a:p>
+            <a:pPr marL="990600" indent="-457200" algn="just" defTabSz="179388">
+              <a:buFont typeface="Arial" panose="020B0604020202020204" pitchFamily="34" charset="0"/>
+              <a:buChar char="•"/>
+            </a:pPr>
+            <a:r>
+              <a:rPr lang="en-US" sz="4800" dirty="0" smtClean="0">
+                <a:solidFill>
+                  <a:schemeClr val="bg1"/>
+                </a:solidFill>
+                <a:latin typeface="Gill Sans MT" panose="020B0502020104020203" pitchFamily="34" charset="0"/>
+              </a:rPr>
+              <a:t>Applied the Fisher method, which is a powerful method to detect presence of false negatives among nonsignificant </a:t>
+            </a:r>
+            <a:r>
+              <a:rPr lang="en-US" sz="4800" i="1" dirty="0" smtClean="0">
+                <a:solidFill>
+                  <a:schemeClr val="bg1"/>
+                </a:solidFill>
                 <a:latin typeface="Gill Sans MT" panose="020B0502020104020203" pitchFamily="34" charset="0"/>
               </a:rPr>
               <a:t>p</a:t>
             </a:r>
             <a:r>
-              <a:rPr lang="en-US" sz="4000" dirty="0" smtClean="0">
+              <a:rPr lang="en-US" sz="4800" dirty="0" smtClean="0">
+                <a:solidFill>
+                  <a:schemeClr val="bg1"/>
+                </a:solidFill>
                 <a:latin typeface="Gill Sans MT" panose="020B0502020104020203" pitchFamily="34" charset="0"/>
               </a:rPr>
               <a:t>-values (3 </a:t>
             </a:r>
             <a:r>
-              <a:rPr lang="en-US" sz="4000" i="1" dirty="0" err="1" smtClean="0">
+              <a:rPr lang="en-US" sz="4800" i="1" dirty="0" err="1" smtClean="0">
+                <a:solidFill>
+                  <a:schemeClr val="bg1"/>
+                </a:solidFill>
                 <a:latin typeface="Gill Sans MT" panose="020B0502020104020203" pitchFamily="34" charset="0"/>
               </a:rPr>
               <a:t>p</a:t>
             </a:r>
             <a:r>
-              <a:rPr lang="en-US" sz="4000" dirty="0" err="1" smtClean="0">
+              <a:rPr lang="en-US" sz="4800" dirty="0" err="1" smtClean="0">
+                <a:solidFill>
+                  <a:schemeClr val="bg1"/>
+                </a:solidFill>
                 <a:latin typeface="Gill Sans MT" panose="020B0502020104020203" pitchFamily="34" charset="0"/>
               </a:rPr>
               <a:t>s</a:t>
             </a:r>
             <a:r>
-              <a:rPr lang="en-US" sz="4000" dirty="0" smtClean="0">
+              <a:rPr lang="en-US" sz="4800" dirty="0" smtClean="0">
+                <a:solidFill>
+                  <a:schemeClr val="bg1"/>
+                </a:solidFill>
                 <a:latin typeface="Gill Sans MT" panose="020B0502020104020203" pitchFamily="34" charset="0"/>
               </a:rPr>
               <a:t> when medium population effect)</a:t>
             </a:r>
           </a:p>
           <a:p>
-            <a:pPr marL="1143000" indent="-1143000" algn="just">
+            <a:pPr marL="990600" indent="-457200" algn="just" defTabSz="179388">
               <a:buFont typeface="Arial" panose="020B0604020202020204" pitchFamily="34" charset="0"/>
               <a:buChar char="•"/>
             </a:pPr>
             <a:r>
-              <a:rPr lang="en-US" sz="4000" dirty="0" smtClean="0">
+              <a:rPr lang="en-US" sz="4800" dirty="0">
+                <a:solidFill>
+                  <a:schemeClr val="bg1"/>
+                </a:solidFill>
                 <a:latin typeface="Gill Sans MT" panose="020B0502020104020203" pitchFamily="34" charset="0"/>
               </a:rPr>
-              <a:t>Evidence for false negatives in eight psychology </a:t>
-            </a:r>
-            <a:r>
-              <a:rPr lang="en-US" sz="4000" dirty="0" smtClean="0">
+              <a:t>Using distributions of </a:t>
+            </a:r>
+            <a:r>
+              <a:rPr lang="en-US" sz="4800" i="1" dirty="0">
+                <a:solidFill>
+                  <a:schemeClr val="bg1"/>
+                </a:solidFill>
                 <a:latin typeface="Gill Sans MT" panose="020B0502020104020203" pitchFamily="34" charset="0"/>
               </a:rPr>
-              <a:t>journals, providing empirical evidence that nonsignificant results should not be discarded by psychology researchers.</a:t>
-            </a:r>
-            <a:endParaRPr lang="en-US" sz="4000" dirty="0" smtClean="0">
-              <a:latin typeface="Gill Sans MT" panose="020B0502020104020203" pitchFamily="34" charset="0"/>
-            </a:endParaRPr>
-          </a:p>
-          <a:p>
-            <a:pPr marL="1143000" indent="-1143000" algn="just">
+              <a:t>p</a:t>
+            </a:r>
+            <a:r>
+              <a:rPr lang="en-US" sz="4800" dirty="0">
+                <a:solidFill>
+                  <a:schemeClr val="bg1"/>
+                </a:solidFill>
+                <a:latin typeface="Gill Sans MT" panose="020B0502020104020203" pitchFamily="34" charset="0"/>
+              </a:rPr>
+              <a:t>-values is great! See also </a:t>
+            </a:r>
+            <a:r>
+              <a:rPr lang="en-US" sz="4800" i="1" dirty="0">
+                <a:solidFill>
+                  <a:schemeClr val="bg1"/>
+                </a:solidFill>
+                <a:latin typeface="Gill Sans MT" panose="020B0502020104020203" pitchFamily="34" charset="0"/>
+              </a:rPr>
+              <a:t>p</a:t>
+            </a:r>
+            <a:r>
+              <a:rPr lang="en-US" sz="4800" dirty="0">
+                <a:solidFill>
+                  <a:schemeClr val="bg1"/>
+                </a:solidFill>
+                <a:latin typeface="Gill Sans MT" panose="020B0502020104020203" pitchFamily="34" charset="0"/>
+              </a:rPr>
+              <a:t>-uniform (Van </a:t>
+            </a:r>
+            <a:r>
+              <a:rPr lang="en-US" sz="4800" dirty="0" err="1">
+                <a:solidFill>
+                  <a:schemeClr val="bg1"/>
+                </a:solidFill>
+                <a:latin typeface="Gill Sans MT" panose="020B0502020104020203" pitchFamily="34" charset="0"/>
+              </a:rPr>
+              <a:t>Assen</a:t>
+            </a:r>
+            <a:r>
+              <a:rPr lang="en-US" sz="4800" dirty="0">
+                <a:solidFill>
+                  <a:schemeClr val="bg1"/>
+                </a:solidFill>
+                <a:latin typeface="Gill Sans MT" panose="020B0502020104020203" pitchFamily="34" charset="0"/>
+              </a:rPr>
+              <a:t> et al., 2015)</a:t>
+            </a:r>
+          </a:p>
+          <a:p>
+            <a:pPr marL="990600" indent="-457200" algn="just">
               <a:buFont typeface="Arial" panose="020B0604020202020204" pitchFamily="34" charset="0"/>
               <a:buChar char="•"/>
             </a:pPr>
             <a:r>
-              <a:rPr lang="en-US" sz="4000" dirty="0" smtClean="0">
+              <a:rPr lang="en-US" sz="4800" dirty="0" smtClean="0">
+                <a:solidFill>
+                  <a:schemeClr val="bg1"/>
+                </a:solidFill>
                 <a:latin typeface="Gill Sans MT" panose="020B0502020104020203" pitchFamily="34" charset="0"/>
               </a:rPr>
-              <a:t>2 out of 3 psychology papers has sufficient evidence for at least one false negative nonsignificant result</a:t>
-            </a:r>
-          </a:p>
-          <a:p>
-            <a:pPr marL="1143000" indent="-1143000" algn="just">
-              <a:buFont typeface="+mj-lt"/>
-              <a:buAutoNum type="arabicPeriod"/>
+              <a:t>2 out of 3 psychology papers has sufficient evidence for at least one false negative nonsignificant result.</a:t>
+            </a:r>
+          </a:p>
+          <a:p>
+            <a:pPr marL="990600" indent="-457200" algn="just">
+              <a:buFont typeface="Arial" panose="020B0604020202020204" pitchFamily="34" charset="0"/>
+              <a:buChar char="•"/>
             </a:pPr>
-            <a:endParaRPr lang="en-US" sz="4000" dirty="0">
+            <a:r>
+              <a:rPr lang="en-US" sz="4800" dirty="0" smtClean="0">
+                <a:solidFill>
+                  <a:schemeClr val="bg1"/>
+                </a:solidFill>
+                <a:latin typeface="Gill Sans MT" panose="020B0502020104020203" pitchFamily="34" charset="0"/>
+              </a:rPr>
+              <a:t>False negatives problematic, just like false positives; can solve both by increasing the sample </a:t>
+            </a:r>
+            <a:r>
+              <a:rPr lang="en-US" sz="4800" dirty="0" smtClean="0">
+                <a:solidFill>
+                  <a:schemeClr val="bg1"/>
+                </a:solidFill>
+                <a:latin typeface="Gill Sans MT" panose="020B0502020104020203" pitchFamily="34" charset="0"/>
+              </a:rPr>
+              <a:t>size.</a:t>
+            </a:r>
+            <a:endParaRPr lang="en-US" sz="4800" dirty="0" smtClean="0">
+              <a:solidFill>
+                <a:schemeClr val="bg1"/>
+              </a:solidFill>
               <a:latin typeface="Gill Sans MT" panose="020B0502020104020203" pitchFamily="34" charset="0"/>
             </a:endParaRPr>
           </a:p>
-        </p:txBody>
-      </p:sp>
-      <mc:AlternateContent xmlns:mc="http://schemas.openxmlformats.org/markup-compatibility/2006">
-        <mc:Choice xmlns:a14="http://schemas.microsoft.com/office/drawing/2010/main" Requires="a14">
+          <a:p>
+            <a:pPr marL="990600" indent="-457200" algn="just">
+              <a:buFont typeface="Arial" panose="020B0604020202020204" pitchFamily="34" charset="0"/>
+              <a:buChar char="•"/>
+            </a:pPr>
+            <a:r>
+              <a:rPr lang="en-US" sz="4800" dirty="0" smtClean="0">
+                <a:solidFill>
+                  <a:schemeClr val="bg1"/>
+                </a:solidFill>
+                <a:latin typeface="Gill Sans MT" panose="020B0502020104020203" pitchFamily="34" charset="0"/>
+              </a:rPr>
+              <a:t>Sample sizes have hardly changed in psychology since 1985.</a:t>
+            </a:r>
+          </a:p>
+          <a:p>
+            <a:pPr marL="990600" indent="-457200" algn="just">
+              <a:buFont typeface="Arial" panose="020B0604020202020204" pitchFamily="34" charset="0"/>
+              <a:buChar char="•"/>
+            </a:pPr>
+            <a:r>
+              <a:rPr lang="en-US" sz="4800" dirty="0" smtClean="0">
+                <a:solidFill>
+                  <a:schemeClr val="bg1"/>
+                </a:solidFill>
+                <a:latin typeface="Gill Sans MT" panose="020B0502020104020203" pitchFamily="34" charset="0"/>
+              </a:rPr>
+              <a:t>Nonsignificant replications in Reproducibility Project: Psychology (RPP) do not allow strong conclusions about true underlying effect.</a:t>
+            </a:r>
+          </a:p>
+        </p:txBody>
+      </p:sp>
+      <mc:AlternateContent xmlns:mc="http://schemas.openxmlformats.org/markup-compatibility/2006" xmlns:a14="http://schemas.microsoft.com/office/drawing/2010/main">
+        <mc:Choice Requires="a14">
           <p:sp>
             <p:nvSpPr>
               <p:cNvPr id="10" name="Rectangle 9"/>
@@ -7900,8 +8042,8 @@
             </p:nvSpPr>
             <p:spPr>
               <a:xfrm>
-                <a:off x="2785983" y="13621436"/>
-                <a:ext cx="7710765" cy="3276731"/>
+                <a:off x="3682459" y="22904325"/>
+                <a:ext cx="7636001" cy="3276731"/>
               </a:xfrm>
               <a:prstGeom prst="rect">
                 <a:avLst/>
@@ -7956,10 +8098,10 @@
                             <m:t>2</m:t>
                           </m:r>
                           <m:r>
-                            <a:rPr lang="en-US" sz="5400" i="1">
+                            <a:rPr lang="en-US" sz="5400" b="0" i="1" smtClean="0">
                               <a:latin typeface="Cambria Math" panose="02040503050406030204" pitchFamily="18" charset="0"/>
                             </a:rPr>
-                            <m:t>𝑘</m:t>
+                            <m:t>𝐾</m:t>
                           </m:r>
                         </m:sub>
                         <m:sup>
@@ -8003,10 +8145,10 @@
                         </m:sub>
                         <m:sup>
                           <m:r>
-                            <a:rPr lang="en-US" sz="5400" i="1">
+                            <a:rPr lang="en-US" sz="5400" b="0" i="1" smtClean="0">
                               <a:latin typeface="Cambria Math" panose="02040503050406030204" pitchFamily="18" charset="0"/>
                             </a:rPr>
-                            <m:t>𝑘</m:t>
+                            <m:t>𝐾</m:t>
                           </m:r>
                         </m:sup>
                         <m:e>
@@ -8115,7 +8257,7 @@
             </p:txBody>
           </p:sp>
         </mc:Choice>
-        <mc:Fallback>
+        <mc:Fallback xmlns="">
           <p:sp>
             <p:nvSpPr>
               <p:cNvPr id="10" name="Rectangle 9"/>
@@ -8126,8 +8268,8 @@
             </p:nvSpPr>
             <p:spPr>
               <a:xfrm>
-                <a:off x="2785983" y="13621436"/>
-                <a:ext cx="7710765" cy="3276731"/>
+                <a:off x="3682459" y="22904325"/>
+                <a:ext cx="7636001" cy="3276731"/>
               </a:xfrm>
               <a:prstGeom prst="rect">
                 <a:avLst/>
@@ -8162,8 +8304,8 @@
         </p:nvSpPr>
         <p:spPr>
           <a:xfrm>
-            <a:off x="1298539" y="17470811"/>
-            <a:ext cx="11079950" cy="1323439"/>
+            <a:off x="2157633" y="26601300"/>
+            <a:ext cx="11079950" cy="2554545"/>
           </a:xfrm>
           <a:prstGeom prst="rect">
             <a:avLst/>
@@ -8204,13 +8346,7 @@
               <a:rPr lang="en-US" sz="4000" dirty="0" smtClean="0">
                 <a:latin typeface="Gill Sans MT" panose="020B0502020104020203" pitchFamily="34" charset="0"/>
               </a:rPr>
-              <a:t>-values </a:t>
-            </a:r>
-            <a:r>
-              <a:rPr lang="en-US" sz="4000" dirty="0" smtClean="0">
-                <a:latin typeface="Gill Sans MT" panose="020B0502020104020203" pitchFamily="34" charset="0"/>
-              </a:rPr>
-              <a:t>are uniformly distributed (i.e., no effect)</a:t>
+              <a:t>-values are uniformly distributed (i.e., no effect)</a:t>
             </a:r>
           </a:p>
           <a:p>
@@ -8244,10 +8380,29 @@
               </a:rPr>
               <a:t>values are right-skew distributed (i.e., an effect)</a:t>
             </a:r>
+          </a:p>
+          <a:p>
             <a:endParaRPr lang="en-US" sz="4000" i="1" dirty="0">
               <a:latin typeface="Gill Sans MT" panose="020B0502020104020203" pitchFamily="34" charset="0"/>
             </a:endParaRPr>
           </a:p>
+          <a:p>
+            <a:r>
+              <a:rPr lang="en-US" sz="4000" i="1" dirty="0" smtClean="0">
+                <a:latin typeface="Gill Sans MT" panose="020B0502020104020203" pitchFamily="34" charset="0"/>
+              </a:rPr>
+              <a:t>K</a:t>
+            </a:r>
+            <a:r>
+              <a:rPr lang="en-US" sz="4000" dirty="0" smtClean="0">
+                <a:latin typeface="Gill Sans MT" panose="020B0502020104020203" pitchFamily="34" charset="0"/>
+              </a:rPr>
+              <a:t> = the number of nonsignificant results</a:t>
+            </a:r>
+            <a:endParaRPr lang="en-US" sz="4000" i="1" dirty="0">
+              <a:latin typeface="Gill Sans MT" panose="020B0502020104020203" pitchFamily="34" charset="0"/>
+            </a:endParaRPr>
+          </a:p>
         </p:txBody>
       </p:sp>
       <p:sp>
@@ -8258,7 +8413,7 @@
         </p:nvSpPr>
         <p:spPr>
           <a:xfrm>
-            <a:off x="904243" y="12416599"/>
+            <a:off x="1763337" y="21699488"/>
             <a:ext cx="11474246" cy="1015663"/>
           </a:xfrm>
           <a:prstGeom prst="rect">
@@ -8277,19 +8432,46 @@
               <a:rPr lang="en-US" sz="6000" dirty="0" smtClean="0">
                 <a:latin typeface="Gill Sans MT" panose="020B0502020104020203" pitchFamily="34" charset="0"/>
               </a:rPr>
-              <a:t>Testing for </a:t>
-            </a:r>
+              <a:t>Testing for false negatives</a:t>
+            </a:r>
+            <a:endParaRPr lang="en-US" sz="4800" dirty="0">
+              <a:latin typeface="Gill Sans MT" panose="020B0502020104020203" pitchFamily="34" charset="0"/>
+            </a:endParaRPr>
+          </a:p>
+        </p:txBody>
+      </p:sp>
+      <p:sp>
+        <p:nvSpPr>
+          <p:cNvPr id="16" name="TextBox 15"/>
+          <p:cNvSpPr txBox="1"/>
+          <p:nvPr/>
+        </p:nvSpPr>
+        <p:spPr>
+          <a:xfrm>
+            <a:off x="16411287" y="3571336"/>
+            <a:ext cx="11474246" cy="1107996"/>
+          </a:xfrm>
+          <a:prstGeom prst="rect">
+            <a:avLst/>
+          </a:prstGeom>
+          <a:noFill/>
+        </p:spPr>
+        <p:txBody>
+          <a:bodyPr wrap="square" rtlCol="0">
+            <a:spAutoFit/>
+          </a:bodyPr>
+          <a:lstStyle/>
+          <a:p>
+            <a:pPr algn="ctr"/>
             <a:r>
               <a:rPr lang="en-US" sz="6000" dirty="0" smtClean="0">
                 <a:latin typeface="Gill Sans MT" panose="020B0502020104020203" pitchFamily="34" charset="0"/>
               </a:rPr>
-              <a:t>false </a:t>
-            </a:r>
-            <a:r>
-              <a:rPr lang="en-US" sz="6000" dirty="0" smtClean="0">
-                <a:latin typeface="Gill Sans MT" panose="020B0502020104020203" pitchFamily="34" charset="0"/>
-              </a:rPr>
-              <a:t>negatives</a:t>
+              <a:t>Application 1 – false negatives in </a:t>
+            </a:r>
+            <a:r>
+              <a:rPr lang="en-US" sz="6600" dirty="0"/>
+              <a:t>ψ</a:t>
             </a:r>
             <a:endParaRPr lang="en-US" sz="4800" dirty="0">
               <a:latin typeface="Gill Sans MT" panose="020B0502020104020203" pitchFamily="34" charset="0"/>
@@ -8299,13 +8481,123 @@
       </p:sp>
       <p:sp>
         <p:nvSpPr>
-          <p:cNvPr id="16" name="TextBox 15"/>
+          <p:cNvPr id="13" name="TextBox 12"/>
           <p:cNvSpPr txBox="1"/>
           <p:nvPr/>
         </p:nvSpPr>
         <p:spPr>
           <a:xfrm>
-            <a:off x="16016412" y="3610732"/>
+            <a:off x="15375823" y="4753493"/>
+            <a:ext cx="12755424" cy="8402300"/>
+          </a:xfrm>
+          <a:prstGeom prst="rect">
+            <a:avLst/>
+          </a:prstGeom>
+          <a:noFill/>
+        </p:spPr>
+        <p:txBody>
+          <a:bodyPr wrap="square" rtlCol="0">
+            <a:spAutoFit/>
+          </a:bodyPr>
+          <a:lstStyle/>
+          <a:p>
+            <a:pPr marL="857250" indent="-857250" algn="just">
+              <a:buFont typeface="Arial" panose="020B0604020202020204" pitchFamily="34" charset="0"/>
+              <a:buChar char="•"/>
+            </a:pPr>
+            <a:r>
+              <a:rPr lang="en-US" sz="4000" dirty="0" smtClean="0">
+                <a:latin typeface="Gill Sans MT" panose="020B0502020104020203" pitchFamily="34" charset="0"/>
+              </a:rPr>
+              <a:t>54,595 nonsignificant </a:t>
+            </a:r>
+            <a:r>
+              <a:rPr lang="en-US" sz="4000" i="1" dirty="0" smtClean="0">
+                <a:latin typeface="Gill Sans MT" panose="020B0502020104020203" pitchFamily="34" charset="0"/>
+              </a:rPr>
+              <a:t>p</a:t>
+            </a:r>
+            <a:r>
+              <a:rPr lang="en-US" sz="4000" dirty="0" smtClean="0">
+                <a:latin typeface="Gill Sans MT" panose="020B0502020104020203" pitchFamily="34" charset="0"/>
+              </a:rPr>
+              <a:t>-values extracted from 6,591 papers in 8 well-known psychology journals (data from Nuijten et al., 2015)</a:t>
+            </a:r>
+          </a:p>
+          <a:p>
+            <a:pPr marL="857250" indent="-857250" algn="just">
+              <a:buFont typeface="Arial" panose="020B0604020202020204" pitchFamily="34" charset="0"/>
+              <a:buChar char="•"/>
+            </a:pPr>
+            <a:r>
+              <a:rPr lang="en-US" sz="4000" dirty="0" smtClean="0">
+                <a:latin typeface="Gill Sans MT" panose="020B0502020104020203" pitchFamily="34" charset="0"/>
+              </a:rPr>
+              <a:t>66.7% of the 6,951 papers show evidence for at least one false negative, varying across journals (49.4%-81.3%), and dependent on the number of nonsignificant results reported (</a:t>
+            </a:r>
+            <a:r>
+              <a:rPr lang="en-US" sz="4000" i="1" dirty="0" smtClean="0">
+                <a:latin typeface="Gill Sans MT" panose="020B0502020104020203" pitchFamily="34" charset="0"/>
+              </a:rPr>
+              <a:t>r</a:t>
+            </a:r>
+            <a:r>
+              <a:rPr lang="en-US" sz="4000" dirty="0" smtClean="0">
+                <a:latin typeface="Gill Sans MT" panose="020B0502020104020203" pitchFamily="34" charset="0"/>
+              </a:rPr>
+              <a:t> = .617)</a:t>
+            </a:r>
+          </a:p>
+          <a:p>
+            <a:pPr marL="857250" indent="-857250" algn="just">
+              <a:buFont typeface="Arial" panose="020B0604020202020204" pitchFamily="34" charset="0"/>
+              <a:buChar char="•"/>
+            </a:pPr>
+            <a:r>
+              <a:rPr lang="en-US" sz="4000" dirty="0" smtClean="0">
+                <a:latin typeface="Gill Sans MT" panose="020B0502020104020203" pitchFamily="34" charset="0"/>
+              </a:rPr>
+              <a:t>More nonsignificant results reported throughout the years, but less evidence for false negatives. Data indicate more smaller effects are reported over time.</a:t>
+            </a:r>
+          </a:p>
+          <a:p>
+            <a:pPr marL="857250" indent="-857250" algn="just">
+              <a:buFont typeface="Arial" panose="020B0604020202020204" pitchFamily="34" charset="0"/>
+              <a:buChar char="•"/>
+            </a:pPr>
+            <a:endParaRPr lang="en-US" sz="4000" dirty="0" smtClean="0">
+              <a:latin typeface="Gill Sans MT" panose="020B0502020104020203" pitchFamily="34" charset="0"/>
+            </a:endParaRPr>
+          </a:p>
+          <a:p>
+            <a:pPr marL="857250" indent="-857250" algn="just">
+              <a:buFont typeface="Arial" panose="020B0604020202020204" pitchFamily="34" charset="0"/>
+              <a:buChar char="•"/>
+            </a:pPr>
+            <a:endParaRPr lang="en-US" sz="4000" dirty="0">
+              <a:latin typeface="Gill Sans MT" panose="020B0502020104020203" pitchFamily="34" charset="0"/>
+            </a:endParaRPr>
+          </a:p>
+          <a:p>
+            <a:pPr marL="857250" indent="-857250" algn="just">
+              <a:buFont typeface="Arial" panose="020B0604020202020204" pitchFamily="34" charset="0"/>
+              <a:buChar char="•"/>
+            </a:pPr>
+            <a:endParaRPr lang="en-US" sz="6000" dirty="0">
+              <a:latin typeface="Gill Sans MT" panose="020B0502020104020203" pitchFamily="34" charset="0"/>
+            </a:endParaRPr>
+          </a:p>
+        </p:txBody>
+      </p:sp>
+      <p:sp>
+        <p:nvSpPr>
+          <p:cNvPr id="22" name="TextBox 21"/>
+          <p:cNvSpPr txBox="1"/>
+          <p:nvPr/>
+        </p:nvSpPr>
+        <p:spPr>
+          <a:xfrm>
+            <a:off x="1662332" y="29769327"/>
             <a:ext cx="11474246" cy="1015663"/>
           </a:xfrm>
           <a:prstGeom prst="rect">
@@ -8324,7 +8616,7 @@
               <a:rPr lang="en-US" sz="6000" dirty="0" smtClean="0">
                 <a:latin typeface="Gill Sans MT" panose="020B0502020104020203" pitchFamily="34" charset="0"/>
               </a:rPr>
-              <a:t>Application</a:t>
+              <a:t>Simulation study</a:t>
             </a:r>
             <a:endParaRPr lang="en-US" sz="4800" dirty="0">
               <a:latin typeface="Gill Sans MT" panose="020B0502020104020203" pitchFamily="34" charset="0"/>
@@ -8334,14 +8626,14 @@
       </p:sp>
       <p:sp>
         <p:nvSpPr>
-          <p:cNvPr id="13" name="TextBox 12"/>
+          <p:cNvPr id="17" name="TextBox 16"/>
           <p:cNvSpPr txBox="1"/>
           <p:nvPr/>
         </p:nvSpPr>
         <p:spPr>
           <a:xfrm>
-            <a:off x="15375823" y="4524893"/>
-            <a:ext cx="12755424" cy="25637788"/>
+            <a:off x="1960484" y="31015054"/>
+            <a:ext cx="11079950" cy="1938992"/>
           </a:xfrm>
           <a:prstGeom prst="rect">
             <a:avLst/>
@@ -8354,435 +8646,11 @@
           </a:bodyPr>
           <a:lstStyle/>
           <a:p>
-            <a:pPr marL="857250" indent="-857250" algn="just">
-              <a:buFont typeface="Arial" panose="020B0604020202020204" pitchFamily="34" charset="0"/>
-              <a:buChar char="•"/>
-            </a:pPr>
-            <a:r>
-              <a:rPr lang="en-US" sz="4000" dirty="0" smtClean="0">
-                <a:latin typeface="Gill Sans MT" panose="020B0502020104020203" pitchFamily="34" charset="0"/>
-              </a:rPr>
-              <a:t>Use 54,595 nonsignificant results over 6,591 papers</a:t>
-            </a:r>
-          </a:p>
-          <a:p>
-            <a:pPr marL="857250" indent="-857250" algn="just">
-              <a:buFont typeface="Arial" panose="020B0604020202020204" pitchFamily="34" charset="0"/>
-              <a:buChar char="•"/>
-            </a:pPr>
-            <a:r>
-              <a:rPr lang="en-US" sz="4000" dirty="0" smtClean="0">
-                <a:latin typeface="Gill Sans MT" panose="020B0502020104020203" pitchFamily="34" charset="0"/>
-              </a:rPr>
-              <a:t>Data collected with </a:t>
-            </a:r>
-            <a:r>
-              <a:rPr lang="en-US" sz="4000" dirty="0" smtClean="0">
-                <a:latin typeface="Gill Sans MT" panose="020B0502020104020203" pitchFamily="34" charset="0"/>
-              </a:rPr>
-              <a:t>`</a:t>
-            </a:r>
-            <a:r>
-              <a:rPr lang="en-US" sz="4000" dirty="0" err="1" smtClean="0">
-                <a:latin typeface="Gill Sans MT" panose="020B0502020104020203" pitchFamily="34" charset="0"/>
-              </a:rPr>
-              <a:t>statcheck</a:t>
-            </a:r>
-            <a:r>
-              <a:rPr lang="en-US" sz="4000" dirty="0" smtClean="0">
-                <a:latin typeface="Gill Sans MT" panose="020B0502020104020203" pitchFamily="34" charset="0"/>
-              </a:rPr>
-              <a:t>` </a:t>
-            </a:r>
-            <a:r>
-              <a:rPr lang="en-US" sz="4000" dirty="0" smtClean="0">
-                <a:latin typeface="Gill Sans MT" panose="020B0502020104020203" pitchFamily="34" charset="0"/>
-              </a:rPr>
-              <a:t>for </a:t>
-            </a:r>
-            <a:r>
-              <a:rPr lang="en-US" sz="4000" dirty="0" smtClean="0">
-                <a:latin typeface="Gill Sans MT" panose="020B0502020104020203" pitchFamily="34" charset="0"/>
-              </a:rPr>
-              <a:t>~30,000 papers </a:t>
-            </a:r>
-            <a:r>
-              <a:rPr lang="en-US" sz="4000" dirty="0" smtClean="0">
-                <a:latin typeface="Gill Sans MT" panose="020B0502020104020203" pitchFamily="34" charset="0"/>
-              </a:rPr>
-              <a:t>in eight psychology papers from 1985-2013 (data also used in Nuijten et al. 2015</a:t>
-            </a:r>
-            <a:r>
-              <a:rPr lang="en-US" sz="4000" dirty="0" smtClean="0">
-                <a:latin typeface="Gill Sans MT" panose="020B0502020104020203" pitchFamily="34" charset="0"/>
-              </a:rPr>
-              <a:t>)</a:t>
-            </a:r>
-          </a:p>
-          <a:p>
-            <a:pPr marL="857250" indent="-857250" algn="just">
-              <a:buFont typeface="Arial" panose="020B0604020202020204" pitchFamily="34" charset="0"/>
-              <a:buChar char="•"/>
-            </a:pPr>
-            <a:r>
-              <a:rPr lang="en-US" sz="4000" dirty="0" smtClean="0">
-                <a:latin typeface="Gill Sans MT" panose="020B0502020104020203" pitchFamily="34" charset="0"/>
-              </a:rPr>
-              <a:t>Extracted 54,595 </a:t>
-            </a:r>
-            <a:r>
-              <a:rPr lang="en-US" sz="4000" dirty="0" err="1" smtClean="0">
-                <a:latin typeface="Gill Sans MT" panose="020B0502020104020203" pitchFamily="34" charset="0"/>
-              </a:rPr>
-              <a:t>nonsiginificant</a:t>
-            </a:r>
-            <a:r>
-              <a:rPr lang="en-US" sz="4000" dirty="0" smtClean="0">
-                <a:latin typeface="Gill Sans MT" panose="020B0502020104020203" pitchFamily="34" charset="0"/>
-              </a:rPr>
-              <a:t> results across 14,759 papers</a:t>
-            </a:r>
-          </a:p>
-          <a:p>
-            <a:pPr marL="857250" indent="-857250" algn="just">
-              <a:buFont typeface="Arial" panose="020B0604020202020204" pitchFamily="34" charset="0"/>
-              <a:buChar char="•"/>
-            </a:pPr>
-            <a:r>
-              <a:rPr lang="en-US" sz="4000" dirty="0" smtClean="0">
-                <a:latin typeface="Gill Sans MT" panose="020B0502020104020203" pitchFamily="34" charset="0"/>
-              </a:rPr>
-              <a:t>6,951 of these 14,759 papers reporting nonsignificant results show evidence for at least one false negative (66.7%)</a:t>
-            </a:r>
-          </a:p>
-          <a:p>
-            <a:pPr marL="857250" indent="-857250" algn="just">
-              <a:buFont typeface="Arial" panose="020B0604020202020204" pitchFamily="34" charset="0"/>
-              <a:buChar char="•"/>
-            </a:pPr>
-            <a:r>
-              <a:rPr lang="en-US" sz="4000" dirty="0" smtClean="0">
-                <a:latin typeface="Gill Sans MT" panose="020B0502020104020203" pitchFamily="34" charset="0"/>
-              </a:rPr>
-              <a:t>Percentage of papers with evidence for false negatives varies across journals, from 49.4% (</a:t>
-            </a:r>
             <a:r>
               <a:rPr lang="en-US" sz="4000" i="1" dirty="0" smtClean="0">
                 <a:latin typeface="Gill Sans MT" panose="020B0502020104020203" pitchFamily="34" charset="0"/>
               </a:rPr>
-              <a:t>Journal of Applied Psychology</a:t>
-            </a:r>
-            <a:r>
-              <a:rPr lang="en-US" sz="4000" dirty="0" smtClean="0">
-                <a:latin typeface="Gill Sans MT" panose="020B0502020104020203" pitchFamily="34" charset="0"/>
-              </a:rPr>
-              <a:t>) to 81.3% (</a:t>
-            </a:r>
-            <a:r>
-              <a:rPr lang="en-US" sz="4000" i="1" dirty="0" smtClean="0">
-                <a:latin typeface="Gill Sans MT" panose="020B0502020104020203" pitchFamily="34" charset="0"/>
-              </a:rPr>
-              <a:t>Journal of Personality and Social Psychology</a:t>
-            </a:r>
-            <a:r>
-              <a:rPr lang="en-US" sz="4000" dirty="0" smtClean="0">
-                <a:latin typeface="Gill Sans MT" panose="020B0502020104020203" pitchFamily="34" charset="0"/>
-              </a:rPr>
-              <a:t>)</a:t>
-            </a:r>
-          </a:p>
-          <a:p>
-            <a:pPr marL="857250" indent="-857250" algn="just">
-              <a:buFont typeface="Arial" panose="020B0604020202020204" pitchFamily="34" charset="0"/>
-              <a:buChar char="•"/>
-            </a:pPr>
-            <a:r>
-              <a:rPr lang="en-US" sz="4000" dirty="0" smtClean="0">
-                <a:latin typeface="Gill Sans MT" panose="020B0502020104020203" pitchFamily="34" charset="0"/>
-              </a:rPr>
-              <a:t>Correlation between median number of nonsignificant results strongly correlates with evidence of at least one false negative (</a:t>
-            </a:r>
-            <a:r>
-              <a:rPr lang="en-US" sz="4000" i="1" dirty="0" smtClean="0">
-                <a:latin typeface="Gill Sans MT" panose="020B0502020104020203" pitchFamily="34" charset="0"/>
-              </a:rPr>
-              <a:t>r</a:t>
-            </a:r>
-            <a:r>
-              <a:rPr lang="en-US" sz="4000" dirty="0" smtClean="0">
-                <a:latin typeface="Gill Sans MT" panose="020B0502020104020203" pitchFamily="34" charset="0"/>
-              </a:rPr>
-              <a:t> = .617)</a:t>
-            </a:r>
-          </a:p>
-          <a:p>
-            <a:pPr marL="857250" indent="-857250" algn="just">
-              <a:buFont typeface="Arial" panose="020B0604020202020204" pitchFamily="34" charset="0"/>
-              <a:buChar char="•"/>
-            </a:pPr>
-            <a:r>
-              <a:rPr lang="en-US" sz="4000" dirty="0" smtClean="0">
-                <a:latin typeface="Gill Sans MT" panose="020B0502020104020203" pitchFamily="34" charset="0"/>
-              </a:rPr>
-              <a:t>Sample sizes in psychology highly stable throughout thirty years</a:t>
-            </a:r>
-          </a:p>
-          <a:p>
-            <a:pPr marL="857250" indent="-857250" algn="just">
-              <a:buFont typeface="Arial" panose="020B0604020202020204" pitchFamily="34" charset="0"/>
-              <a:buChar char="•"/>
-            </a:pPr>
-            <a:endParaRPr lang="en-US" sz="4000" dirty="0">
-              <a:latin typeface="Gill Sans MT" panose="020B0502020104020203" pitchFamily="34" charset="0"/>
-            </a:endParaRPr>
-          </a:p>
-          <a:p>
-            <a:pPr marL="857250" indent="-857250" algn="just">
-              <a:buFont typeface="Arial" panose="020B0604020202020204" pitchFamily="34" charset="0"/>
-              <a:buChar char="•"/>
-            </a:pPr>
-            <a:endParaRPr lang="en-US" sz="4000" dirty="0" smtClean="0">
-              <a:latin typeface="Gill Sans MT" panose="020B0502020104020203" pitchFamily="34" charset="0"/>
-            </a:endParaRPr>
-          </a:p>
-          <a:p>
-            <a:pPr marL="857250" indent="-857250" algn="just">
-              <a:buFont typeface="Arial" panose="020B0604020202020204" pitchFamily="34" charset="0"/>
-              <a:buChar char="•"/>
-            </a:pPr>
-            <a:endParaRPr lang="en-US" sz="4000" dirty="0">
-              <a:latin typeface="Gill Sans MT" panose="020B0502020104020203" pitchFamily="34" charset="0"/>
-            </a:endParaRPr>
-          </a:p>
-          <a:p>
-            <a:pPr marL="857250" indent="-857250" algn="just">
-              <a:buFont typeface="Arial" panose="020B0604020202020204" pitchFamily="34" charset="0"/>
-              <a:buChar char="•"/>
-            </a:pPr>
-            <a:endParaRPr lang="en-US" sz="4000" dirty="0" smtClean="0">
-              <a:latin typeface="Gill Sans MT" panose="020B0502020104020203" pitchFamily="34" charset="0"/>
-            </a:endParaRPr>
-          </a:p>
-          <a:p>
-            <a:pPr marL="857250" indent="-857250" algn="just">
-              <a:buFont typeface="Arial" panose="020B0604020202020204" pitchFamily="34" charset="0"/>
-              <a:buChar char="•"/>
-            </a:pPr>
-            <a:endParaRPr lang="en-US" sz="4000" dirty="0">
-              <a:latin typeface="Gill Sans MT" panose="020B0502020104020203" pitchFamily="34" charset="0"/>
-            </a:endParaRPr>
-          </a:p>
-          <a:p>
-            <a:pPr marL="857250" indent="-857250" algn="just">
-              <a:buFont typeface="Arial" panose="020B0604020202020204" pitchFamily="34" charset="0"/>
-              <a:buChar char="•"/>
-            </a:pPr>
-            <a:endParaRPr lang="en-US" sz="4000" dirty="0" smtClean="0">
-              <a:latin typeface="Gill Sans MT" panose="020B0502020104020203" pitchFamily="34" charset="0"/>
-            </a:endParaRPr>
-          </a:p>
-          <a:p>
-            <a:pPr marL="857250" indent="-857250" algn="just">
-              <a:buFont typeface="Arial" panose="020B0604020202020204" pitchFamily="34" charset="0"/>
-              <a:buChar char="•"/>
-            </a:pPr>
-            <a:endParaRPr lang="en-US" sz="4000" dirty="0">
-              <a:latin typeface="Gill Sans MT" panose="020B0502020104020203" pitchFamily="34" charset="0"/>
-            </a:endParaRPr>
-          </a:p>
-          <a:p>
-            <a:pPr marL="857250" indent="-857250" algn="just">
-              <a:buFont typeface="Arial" panose="020B0604020202020204" pitchFamily="34" charset="0"/>
-              <a:buChar char="•"/>
-            </a:pPr>
-            <a:endParaRPr lang="en-US" sz="4000" dirty="0" smtClean="0">
-              <a:latin typeface="Gill Sans MT" panose="020B0502020104020203" pitchFamily="34" charset="0"/>
-            </a:endParaRPr>
-          </a:p>
-          <a:p>
-            <a:pPr marL="857250" indent="-857250" algn="just">
-              <a:buFont typeface="Arial" panose="020B0604020202020204" pitchFamily="34" charset="0"/>
-              <a:buChar char="•"/>
-            </a:pPr>
-            <a:endParaRPr lang="en-US" sz="4000" dirty="0">
-              <a:latin typeface="Gill Sans MT" panose="020B0502020104020203" pitchFamily="34" charset="0"/>
-            </a:endParaRPr>
-          </a:p>
-          <a:p>
-            <a:pPr marL="857250" indent="-857250" algn="just">
-              <a:buFont typeface="Arial" panose="020B0604020202020204" pitchFamily="34" charset="0"/>
-              <a:buChar char="•"/>
-            </a:pPr>
-            <a:endParaRPr lang="en-US" sz="4000" dirty="0" smtClean="0">
-              <a:latin typeface="Gill Sans MT" panose="020B0502020104020203" pitchFamily="34" charset="0"/>
-            </a:endParaRPr>
-          </a:p>
-          <a:p>
-            <a:pPr marL="857250" indent="-857250" algn="just">
-              <a:buFont typeface="Arial" panose="020B0604020202020204" pitchFamily="34" charset="0"/>
-              <a:buChar char="•"/>
-            </a:pPr>
-            <a:endParaRPr lang="en-US" sz="4000" dirty="0">
-              <a:latin typeface="Gill Sans MT" panose="020B0502020104020203" pitchFamily="34" charset="0"/>
-            </a:endParaRPr>
-          </a:p>
-          <a:p>
-            <a:pPr marL="857250" indent="-857250" algn="just">
-              <a:buFont typeface="Arial" panose="020B0604020202020204" pitchFamily="34" charset="0"/>
-              <a:buChar char="•"/>
-            </a:pPr>
-            <a:endParaRPr lang="en-US" sz="4000" dirty="0" smtClean="0">
-              <a:latin typeface="Gill Sans MT" panose="020B0502020104020203" pitchFamily="34" charset="0"/>
-            </a:endParaRPr>
-          </a:p>
-          <a:p>
-            <a:pPr marL="857250" indent="-857250" algn="just">
-              <a:buFont typeface="Arial" panose="020B0604020202020204" pitchFamily="34" charset="0"/>
-              <a:buChar char="•"/>
-            </a:pPr>
-            <a:endParaRPr lang="en-US" sz="4000" dirty="0">
-              <a:latin typeface="Gill Sans MT" panose="020B0502020104020203" pitchFamily="34" charset="0"/>
-            </a:endParaRPr>
-          </a:p>
-          <a:p>
-            <a:pPr marL="857250" indent="-857250" algn="just">
-              <a:buFont typeface="Arial" panose="020B0604020202020204" pitchFamily="34" charset="0"/>
-              <a:buChar char="•"/>
-            </a:pPr>
-            <a:endParaRPr lang="en-US" sz="4000" dirty="0" smtClean="0">
-              <a:latin typeface="Gill Sans MT" panose="020B0502020104020203" pitchFamily="34" charset="0"/>
-            </a:endParaRPr>
-          </a:p>
-          <a:p>
-            <a:pPr marL="857250" indent="-857250" algn="just">
-              <a:buFont typeface="Arial" panose="020B0604020202020204" pitchFamily="34" charset="0"/>
-              <a:buChar char="•"/>
-            </a:pPr>
-            <a:endParaRPr lang="en-US" sz="4000" dirty="0">
-              <a:latin typeface="Gill Sans MT" panose="020B0502020104020203" pitchFamily="34" charset="0"/>
-            </a:endParaRPr>
-          </a:p>
-          <a:p>
-            <a:pPr marL="857250" indent="-857250" algn="just">
-              <a:buFont typeface="Arial" panose="020B0604020202020204" pitchFamily="34" charset="0"/>
-              <a:buChar char="•"/>
-            </a:pPr>
-            <a:endParaRPr lang="en-US" sz="4000" dirty="0" smtClean="0">
-              <a:latin typeface="Gill Sans MT" panose="020B0502020104020203" pitchFamily="34" charset="0"/>
-            </a:endParaRPr>
-          </a:p>
-          <a:p>
-            <a:pPr marL="857250" indent="-857250" algn="just">
-              <a:buFont typeface="Arial" panose="020B0604020202020204" pitchFamily="34" charset="0"/>
-              <a:buChar char="•"/>
-            </a:pPr>
-            <a:endParaRPr lang="en-US" sz="4000" dirty="0">
-              <a:latin typeface="Gill Sans MT" panose="020B0502020104020203" pitchFamily="34" charset="0"/>
-            </a:endParaRPr>
-          </a:p>
-          <a:p>
-            <a:pPr marL="857250" indent="-857250" algn="just">
-              <a:buFont typeface="Arial" panose="020B0604020202020204" pitchFamily="34" charset="0"/>
-              <a:buChar char="•"/>
-            </a:pPr>
-            <a:r>
-              <a:rPr lang="en-US" sz="4000" dirty="0" smtClean="0">
-                <a:latin typeface="Gill Sans MT" panose="020B0502020104020203" pitchFamily="34" charset="0"/>
-              </a:rPr>
-              <a:t>More nonsignificant results reported throughout the years, but less evidence for false negatives. Data indicate more smaller effects are reported over time.</a:t>
-            </a:r>
-          </a:p>
-          <a:p>
-            <a:pPr marL="857250" indent="-857250" algn="just">
-              <a:buFont typeface="Arial" panose="020B0604020202020204" pitchFamily="34" charset="0"/>
-              <a:buChar char="•"/>
-            </a:pPr>
-            <a:endParaRPr lang="en-US" sz="4000" dirty="0" smtClean="0">
-              <a:latin typeface="Gill Sans MT" panose="020B0502020104020203" pitchFamily="34" charset="0"/>
-            </a:endParaRPr>
-          </a:p>
-          <a:p>
-            <a:pPr marL="857250" indent="-857250" algn="just">
-              <a:buFont typeface="Arial" panose="020B0604020202020204" pitchFamily="34" charset="0"/>
-              <a:buChar char="•"/>
-            </a:pPr>
-            <a:endParaRPr lang="en-US" sz="4000" dirty="0">
-              <a:latin typeface="Gill Sans MT" panose="020B0502020104020203" pitchFamily="34" charset="0"/>
-            </a:endParaRPr>
-          </a:p>
-          <a:p>
-            <a:pPr marL="857250" indent="-857250" algn="just">
-              <a:buFont typeface="Arial" panose="020B0604020202020204" pitchFamily="34" charset="0"/>
-              <a:buChar char="•"/>
-            </a:pPr>
-            <a:endParaRPr lang="en-US" sz="6000" dirty="0">
-              <a:latin typeface="Gill Sans MT" panose="020B0502020104020203" pitchFamily="34" charset="0"/>
-            </a:endParaRPr>
-          </a:p>
-        </p:txBody>
-      </p:sp>
-      <p:sp>
-        <p:nvSpPr>
-          <p:cNvPr id="22" name="TextBox 21"/>
-          <p:cNvSpPr txBox="1"/>
-          <p:nvPr/>
-        </p:nvSpPr>
-        <p:spPr>
-          <a:xfrm>
-            <a:off x="955638" y="19756558"/>
-            <a:ext cx="11474246" cy="1015663"/>
-          </a:xfrm>
-          <a:prstGeom prst="rect">
-            <a:avLst/>
-          </a:prstGeom>
-          <a:noFill/>
-        </p:spPr>
-        <p:txBody>
-          <a:bodyPr wrap="square" rtlCol="0">
-            <a:spAutoFit/>
-          </a:bodyPr>
-          <a:lstStyle/>
-          <a:p>
-            <a:pPr algn="ctr"/>
-            <a:r>
-              <a:rPr lang="en-US" sz="6000" dirty="0" smtClean="0">
-                <a:latin typeface="Gill Sans MT" panose="020B0502020104020203" pitchFamily="34" charset="0"/>
-              </a:rPr>
-              <a:t>Simulation study</a:t>
-            </a:r>
-            <a:endParaRPr lang="en-US" sz="4800" dirty="0">
-              <a:latin typeface="Gill Sans MT" panose="020B0502020104020203" pitchFamily="34" charset="0"/>
-            </a:endParaRPr>
-          </a:p>
-        </p:txBody>
-      </p:sp>
-      <p:sp>
-        <p:nvSpPr>
-          <p:cNvPr id="17" name="TextBox 16"/>
-          <p:cNvSpPr txBox="1"/>
-          <p:nvPr/>
-        </p:nvSpPr>
-        <p:spPr>
-          <a:xfrm>
-            <a:off x="1275932" y="21072809"/>
-            <a:ext cx="11079950" cy="5632311"/>
-          </a:xfrm>
-          <a:prstGeom prst="rect">
-            <a:avLst/>
-          </a:prstGeom>
-          <a:noFill/>
-        </p:spPr>
-        <p:txBody>
-          <a:bodyPr wrap="square" rtlCol="0">
-            <a:spAutoFit/>
-          </a:bodyPr>
-          <a:lstStyle/>
-          <a:p>
-            <a:r>
-              <a:rPr lang="en-US" sz="4000" i="1" dirty="0" smtClean="0">
-                <a:latin typeface="Gill Sans MT" panose="020B0502020104020203" pitchFamily="34" charset="0"/>
-              </a:rPr>
-              <a:t>What is the power to detect a false negative among a set of nonsignificant </a:t>
+              <a:t>How many nonsignificant results needed to get &gt; .8 power to detect a false negative among a set of nonsignificant </a:t>
             </a:r>
             <a:r>
               <a:rPr lang="en-US" sz="4000" dirty="0" smtClean="0">
@@ -8796,69 +8664,6 @@
               </a:rPr>
               <a:t>-values?</a:t>
             </a:r>
-          </a:p>
-          <a:p>
-            <a:endParaRPr lang="en-US" sz="4000" i="1" dirty="0">
-              <a:latin typeface="Gill Sans MT" panose="020B0502020104020203" pitchFamily="34" charset="0"/>
-            </a:endParaRPr>
-          </a:p>
-          <a:p>
-            <a:r>
-              <a:rPr lang="en-US" sz="4000" dirty="0" smtClean="0">
-                <a:latin typeface="Gill Sans MT" panose="020B0502020104020203" pitchFamily="34" charset="0"/>
-              </a:rPr>
-              <a:t>Simulation design:</a:t>
-            </a:r>
-          </a:p>
-          <a:p>
-            <a:pPr marL="742950" indent="-742950">
-              <a:buAutoNum type="arabicPeriod"/>
-            </a:pPr>
-            <a:r>
-              <a:rPr lang="en-US" sz="4000" dirty="0" smtClean="0">
-                <a:latin typeface="Gill Sans MT" panose="020B0502020104020203" pitchFamily="34" charset="0"/>
-              </a:rPr>
-              <a:t>Sample size single study (N = 33, 62, 119)</a:t>
-            </a:r>
-          </a:p>
-          <a:p>
-            <a:pPr marL="742950" indent="-742950">
-              <a:buAutoNum type="arabicPeriod"/>
-            </a:pPr>
-            <a:r>
-              <a:rPr lang="en-US" sz="4000" dirty="0" smtClean="0">
-                <a:latin typeface="Gill Sans MT" panose="020B0502020104020203" pitchFamily="34" charset="0"/>
-              </a:rPr>
-              <a:t>Number of nonsignificant studies (k = 1, 2, .. 10, 15, 20, ..., 50)</a:t>
-            </a:r>
-          </a:p>
-          <a:p>
-            <a:pPr marL="742950" indent="-742950">
-              <a:buAutoNum type="arabicPeriod"/>
-            </a:pPr>
-            <a:r>
-              <a:rPr lang="en-US" sz="4000" dirty="0" smtClean="0">
-                <a:latin typeface="Gill Sans MT" panose="020B0502020104020203" pitchFamily="34" charset="0"/>
-              </a:rPr>
-              <a:t>Underlying effect size </a:t>
-            </a:r>
-            <a:r>
-              <a:rPr lang="en-US" sz="4000" dirty="0" smtClean="0">
-                <a:latin typeface="Gill Sans MT" panose="020B0502020104020203" pitchFamily="34" charset="0"/>
-              </a:rPr>
-              <a:t>(r = .00, .01, .02, ..., .99)</a:t>
-            </a:r>
-            <a:endParaRPr lang="en-US" sz="4000" dirty="0">
-              <a:latin typeface="Gill Sans MT" panose="020B0502020104020203" pitchFamily="34" charset="0"/>
-            </a:endParaRPr>
-          </a:p>
-          <a:p>
-            <a:pPr marL="742950" indent="-742950">
-              <a:buAutoNum type="arabicPeriod"/>
-            </a:pPr>
-            <a:endParaRPr lang="en-US" sz="4000" dirty="0">
-              <a:latin typeface="Gill Sans MT" panose="020B0502020104020203" pitchFamily="34" charset="0"/>
-            </a:endParaRPr>
           </a:p>
         </p:txBody>
       </p:sp>
@@ -8885,7 +8690,7 @@
         </p:blipFill>
         <p:spPr bwMode="auto">
           <a:xfrm>
-            <a:off x="10380454" y="39059379"/>
+            <a:off x="10380454" y="39211779"/>
             <a:ext cx="8924925" cy="3324226"/>
           </a:xfrm>
           <a:prstGeom prst="rect">
@@ -8905,7 +8710,7 @@
       </p:pic>
       <p:pic>
         <p:nvPicPr>
-          <p:cNvPr id="1029" name="Picture 5" descr="https://lh5.googleusercontent.com/cO2382a-KHfn6CRg9te84FF3vur8wP3eNGUbM4QBOj6ICaSeLoHn3P1DtQTNL6nRx_zpDjl1xYCbCgnOOodJgfNyMAYOfXuRmX3jShnVIO-YeiOa6X5X5N3I5R2LT7wn-rB7Fb_JyxAUKRJM"/>
+          <p:cNvPr id="1033" name="Picture 9" descr="https://lh4.googleusercontent.com/lyAAKFHH3ihnDF9HtNnoRkdy4_zWHZkd82iNs5M7Z5_oH7r4JPUrF-eCqtEz6VJeVhHJK7daghiY1AgPL5PsYgC1dnBFBvGAauasdD9V8pU4um3v2oBeWy27AJjGzHUzijAqeEioxAeUy2O7"/>
           <p:cNvPicPr>
             <a:picLocks noChangeAspect="1" noChangeArrowheads="1"/>
           </p:cNvPicPr>
@@ -8926,8 +8731,8 @@
         </p:blipFill>
         <p:spPr bwMode="auto">
           <a:xfrm>
-            <a:off x="17308959" y="16111024"/>
-            <a:ext cx="9328183" cy="7995585"/>
+            <a:off x="16806162" y="11181639"/>
+            <a:ext cx="10684496" cy="7632737"/>
           </a:xfrm>
           <a:prstGeom prst="rect">
             <a:avLst/>
@@ -8946,100 +8751,13 @@
       </p:pic>
       <p:sp>
         <p:nvSpPr>
-          <p:cNvPr id="14" name="TextBox 13"/>
-          <p:cNvSpPr txBox="1"/>
-          <p:nvPr/>
-        </p:nvSpPr>
-        <p:spPr>
-          <a:xfrm>
-            <a:off x="15375823" y="24106609"/>
-            <a:ext cx="13748669" cy="1569660"/>
-          </a:xfrm>
-          <a:prstGeom prst="rect">
-            <a:avLst/>
-          </a:prstGeom>
-          <a:noFill/>
-        </p:spPr>
-        <p:txBody>
-          <a:bodyPr wrap="square" rtlCol="0">
-            <a:spAutoFit/>
-          </a:bodyPr>
-          <a:lstStyle/>
-          <a:p>
-            <a:r>
-              <a:rPr lang="en-US" sz="3200" i="1" dirty="0"/>
-              <a:t>Figure </a:t>
-            </a:r>
-            <a:r>
-              <a:rPr lang="en-US" sz="3200" i="1" dirty="0"/>
-              <a:t>2</a:t>
-            </a:r>
-            <a:r>
-              <a:rPr lang="en-US" sz="3200" i="1" dirty="0" smtClean="0"/>
-              <a:t>. </a:t>
-            </a:r>
-            <a:r>
-              <a:rPr lang="en-US" sz="3200" dirty="0"/>
-              <a:t>Sample size development throughout 1985-2013, based on degrees of freedom across 258,050 test results. P25 = 25th percentile. P50 = 50th percentile (i.e., median). P75 = 75th </a:t>
-            </a:r>
-            <a:r>
-              <a:rPr lang="en-US" sz="3200" dirty="0" smtClean="0"/>
-              <a:t>percentile.</a:t>
-            </a:r>
-            <a:endParaRPr lang="en-US" sz="3200" dirty="0"/>
-          </a:p>
-        </p:txBody>
-      </p:sp>
-      <p:pic>
-        <p:nvPicPr>
-          <p:cNvPr id="1033" name="Picture 9" descr="https://lh4.googleusercontent.com/lyAAKFHH3ihnDF9HtNnoRkdy4_zWHZkd82iNs5M7Z5_oH7r4JPUrF-eCqtEz6VJeVhHJK7daghiY1AgPL5PsYgC1dnBFBvGAauasdD9V8pU4um3v2oBeWy27AJjGzHUzijAqeEioxAeUy2O7"/>
-          <p:cNvPicPr>
-            <a:picLocks noChangeAspect="1" noChangeArrowheads="1"/>
-          </p:cNvPicPr>
-          <p:nvPr/>
-        </p:nvPicPr>
-        <p:blipFill>
-          <a:blip r:embed="rId6">
-            <a:extLst>
-              <a:ext uri="{28A0092B-C50C-407E-A947-70E740481C1C}">
-                <a14:useLocalDpi xmlns:a14="http://schemas.microsoft.com/office/drawing/2010/main" val="0"/>
-              </a:ext>
-            </a:extLst>
-          </a:blip>
-          <a:srcRect/>
-          <a:stretch>
-            <a:fillRect/>
-          </a:stretch>
-        </p:blipFill>
-        <p:spPr bwMode="auto">
-          <a:xfrm>
-            <a:off x="17308959" y="28164377"/>
-            <a:ext cx="9634349" cy="6882538"/>
-          </a:xfrm>
-          <a:prstGeom prst="rect">
-            <a:avLst/>
-          </a:prstGeom>
-          <a:noFill/>
-          <a:extLst>
-            <a:ext uri="{909E8E84-426E-40DD-AFC4-6F175D3DCCD1}">
-              <a14:hiddenFill xmlns:a14="http://schemas.microsoft.com/office/drawing/2010/main">
-                <a:solidFill>
-                  <a:srgbClr val="FFFFFF"/>
-                </a:solidFill>
-              </a14:hiddenFill>
-            </a:ext>
-          </a:extLst>
-        </p:spPr>
-      </p:pic>
-      <p:sp>
-        <p:nvSpPr>
           <p:cNvPr id="23" name="TextBox 22"/>
           <p:cNvSpPr txBox="1"/>
           <p:nvPr/>
         </p:nvSpPr>
         <p:spPr>
           <a:xfrm>
-            <a:off x="15642523" y="35541869"/>
+            <a:off x="15790007" y="19178954"/>
             <a:ext cx="13748669" cy="2062103"/>
           </a:xfrm>
           <a:prstGeom prst="rect">
@@ -9059,26 +8777,1111 @@
             </a:r>
             <a:r>
               <a:rPr lang="en-US" sz="3200" i="1" dirty="0" smtClean="0"/>
-              <a:t>3. </a:t>
+              <a:t>1. </a:t>
             </a:r>
             <a:r>
               <a:rPr lang="en-US" sz="3200" dirty="0"/>
               <a:t>Proportion of papers reporting nonsignificant results in a given year, showing evidence for false negative results. Larger point size indicates a higher mean number of nonsignificant results reported in that year.</a:t>
             </a:r>
-            <a:endParaRPr lang="en-US" sz="3200" dirty="0"/>
+          </a:p>
+        </p:txBody>
+      </p:sp>
+      <p:graphicFrame>
+        <p:nvGraphicFramePr>
+          <p:cNvPr id="4" name="Table 3"/>
+          <p:cNvGraphicFramePr>
+            <a:graphicFrameLocks noGrp="1"/>
+          </p:cNvGraphicFramePr>
+          <p:nvPr>
+            <p:extLst>
+              <p:ext uri="{D42A27DB-BD31-4B8C-83A1-F6EECF244321}">
+                <p14:modId xmlns:p14="http://schemas.microsoft.com/office/powerpoint/2010/main" val="1727611962"/>
+              </p:ext>
+            </p:extLst>
+          </p:nvPr>
+        </p:nvGraphicFramePr>
+        <p:xfrm>
+          <a:off x="1960484" y="33621007"/>
+          <a:ext cx="10536150" cy="3387724"/>
+        </p:xfrm>
+        <a:graphic>
+          <a:graphicData uri="http://schemas.openxmlformats.org/drawingml/2006/table">
+            <a:tbl>
+              <a:tblPr>
+                <a:tableStyleId>{5C22544A-7EE6-4342-B048-85BDC9FD1C3A}</a:tableStyleId>
+              </a:tblPr>
+              <a:tblGrid>
+                <a:gridCol w="4759986"/>
+                <a:gridCol w="1818422"/>
+                <a:gridCol w="1818422"/>
+                <a:gridCol w="2139320"/>
+              </a:tblGrid>
+              <a:tr h="874252">
+                <a:tc>
+                  <a:txBody>
+                    <a:bodyPr/>
+                    <a:lstStyle/>
+                    <a:p>
+                      <a:pPr algn="l" fontAlgn="b"/>
+                      <a:r>
+                        <a:rPr lang="en-US" sz="4000" u="none" strike="noStrike" dirty="0">
+                          <a:solidFill>
+                            <a:schemeClr val="tx1"/>
+                          </a:solidFill>
+                          <a:effectLst/>
+                        </a:rPr>
+                        <a:t> </a:t>
+                      </a:r>
+                      <a:endParaRPr lang="en-US" sz="4000" b="1" i="0" u="none" strike="noStrike" dirty="0">
+                        <a:solidFill>
+                          <a:schemeClr val="tx1"/>
+                        </a:solidFill>
+                        <a:effectLst/>
+                        <a:latin typeface="Gill Sans MT" panose="020B0502020104020203" pitchFamily="34" charset="0"/>
+                      </a:endParaRPr>
+                    </a:p>
+                  </a:txBody>
+                  <a:tcPr marL="9525" marR="9525" marT="9525" marB="0" anchor="b">
+                    <a:lnL w="12700" cmpd="sng">
+                      <a:noFill/>
+                    </a:lnL>
+                    <a:lnR w="12700" cmpd="sng">
+                      <a:noFill/>
+                    </a:lnR>
+                    <a:lnT w="12700" cap="flat" cmpd="sng" algn="ctr">
+                      <a:solidFill>
+                        <a:schemeClr val="tx1"/>
+                      </a:solidFill>
+                      <a:prstDash val="solid"/>
+                      <a:round/>
+                      <a:headEnd type="none" w="med" len="med"/>
+                      <a:tailEnd type="none" w="med" len="med"/>
+                    </a:lnT>
+                    <a:lnB w="12700" cap="flat" cmpd="sng" algn="ctr">
+                      <a:solidFill>
+                        <a:schemeClr val="tx1"/>
+                      </a:solidFill>
+                      <a:prstDash val="solid"/>
+                      <a:round/>
+                      <a:headEnd type="none" w="med" len="med"/>
+                      <a:tailEnd type="none" w="med" len="med"/>
+                    </a:lnB>
+                    <a:lnTlToBr w="12700" cmpd="sng">
+                      <a:noFill/>
+                      <a:prstDash val="solid"/>
+                    </a:lnTlToBr>
+                    <a:lnBlToTr w="12700" cmpd="sng">
+                      <a:noFill/>
+                      <a:prstDash val="solid"/>
+                    </a:lnBlToTr>
+                    <a:solidFill>
+                      <a:schemeClr val="bg1"/>
+                    </a:solidFill>
+                  </a:tcPr>
+                </a:tc>
+                <a:tc>
+                  <a:txBody>
+                    <a:bodyPr/>
+                    <a:lstStyle/>
+                    <a:p>
+                      <a:pPr algn="ctr" fontAlgn="b"/>
+                      <a:r>
+                        <a:rPr lang="en-US" sz="4400" u="none" strike="noStrike" dirty="0">
+                          <a:solidFill>
+                            <a:schemeClr val="tx1"/>
+                          </a:solidFill>
+                          <a:effectLst/>
+                        </a:rPr>
+                        <a:t>N=33</a:t>
+                      </a:r>
+                      <a:endParaRPr lang="en-US" sz="4400" b="1" i="0" u="none" strike="noStrike" dirty="0">
+                        <a:solidFill>
+                          <a:schemeClr val="tx1"/>
+                        </a:solidFill>
+                        <a:effectLst/>
+                        <a:latin typeface="Gill Sans MT" panose="020B0502020104020203" pitchFamily="34" charset="0"/>
+                      </a:endParaRPr>
+                    </a:p>
+                  </a:txBody>
+                  <a:tcPr marL="9525" marR="9525" marT="9525" marB="0" anchor="b">
+                    <a:lnL w="12700" cmpd="sng">
+                      <a:noFill/>
+                    </a:lnL>
+                    <a:lnR w="12700" cmpd="sng">
+                      <a:noFill/>
+                    </a:lnR>
+                    <a:lnT w="12700" cap="flat" cmpd="sng" algn="ctr">
+                      <a:solidFill>
+                        <a:schemeClr val="tx1"/>
+                      </a:solidFill>
+                      <a:prstDash val="solid"/>
+                      <a:round/>
+                      <a:headEnd type="none" w="med" len="med"/>
+                      <a:tailEnd type="none" w="med" len="med"/>
+                    </a:lnT>
+                    <a:lnB w="12700" cap="flat" cmpd="sng" algn="ctr">
+                      <a:solidFill>
+                        <a:schemeClr val="tx1"/>
+                      </a:solidFill>
+                      <a:prstDash val="solid"/>
+                      <a:round/>
+                      <a:headEnd type="none" w="med" len="med"/>
+                      <a:tailEnd type="none" w="med" len="med"/>
+                    </a:lnB>
+                    <a:lnTlToBr w="12700" cmpd="sng">
+                      <a:noFill/>
+                      <a:prstDash val="solid"/>
+                    </a:lnTlToBr>
+                    <a:lnBlToTr w="12700" cmpd="sng">
+                      <a:noFill/>
+                      <a:prstDash val="solid"/>
+                    </a:lnBlToTr>
+                    <a:solidFill>
+                      <a:schemeClr val="bg1"/>
+                    </a:solidFill>
+                  </a:tcPr>
+                </a:tc>
+                <a:tc>
+                  <a:txBody>
+                    <a:bodyPr/>
+                    <a:lstStyle/>
+                    <a:p>
+                      <a:pPr algn="ctr" fontAlgn="b"/>
+                      <a:r>
+                        <a:rPr lang="en-US" sz="4400" u="none" strike="noStrike" dirty="0">
+                          <a:solidFill>
+                            <a:schemeClr val="tx1"/>
+                          </a:solidFill>
+                          <a:effectLst/>
+                        </a:rPr>
+                        <a:t>N=62</a:t>
+                      </a:r>
+                      <a:endParaRPr lang="en-US" sz="4400" b="1" i="0" u="none" strike="noStrike" dirty="0">
+                        <a:solidFill>
+                          <a:schemeClr val="tx1"/>
+                        </a:solidFill>
+                        <a:effectLst/>
+                        <a:latin typeface="Gill Sans MT" panose="020B0502020104020203" pitchFamily="34" charset="0"/>
+                      </a:endParaRPr>
+                    </a:p>
+                  </a:txBody>
+                  <a:tcPr marL="9525" marR="9525" marT="9525" marB="0" anchor="b">
+                    <a:lnL w="12700" cmpd="sng">
+                      <a:noFill/>
+                    </a:lnL>
+                    <a:lnR w="12700" cmpd="sng">
+                      <a:noFill/>
+                    </a:lnR>
+                    <a:lnT w="12700" cap="flat" cmpd="sng" algn="ctr">
+                      <a:solidFill>
+                        <a:schemeClr val="tx1"/>
+                      </a:solidFill>
+                      <a:prstDash val="solid"/>
+                      <a:round/>
+                      <a:headEnd type="none" w="med" len="med"/>
+                      <a:tailEnd type="none" w="med" len="med"/>
+                    </a:lnT>
+                    <a:lnB w="12700" cap="flat" cmpd="sng" algn="ctr">
+                      <a:solidFill>
+                        <a:schemeClr val="tx1"/>
+                      </a:solidFill>
+                      <a:prstDash val="solid"/>
+                      <a:round/>
+                      <a:headEnd type="none" w="med" len="med"/>
+                      <a:tailEnd type="none" w="med" len="med"/>
+                    </a:lnB>
+                    <a:lnTlToBr w="12700" cmpd="sng">
+                      <a:noFill/>
+                      <a:prstDash val="solid"/>
+                    </a:lnTlToBr>
+                    <a:lnBlToTr w="12700" cmpd="sng">
+                      <a:noFill/>
+                      <a:prstDash val="solid"/>
+                    </a:lnBlToTr>
+                    <a:solidFill>
+                      <a:schemeClr val="bg1"/>
+                    </a:solidFill>
+                  </a:tcPr>
+                </a:tc>
+                <a:tc>
+                  <a:txBody>
+                    <a:bodyPr/>
+                    <a:lstStyle/>
+                    <a:p>
+                      <a:pPr algn="ctr" fontAlgn="b"/>
+                      <a:r>
+                        <a:rPr lang="en-US" sz="4400" u="none" strike="noStrike" dirty="0">
+                          <a:solidFill>
+                            <a:schemeClr val="tx1"/>
+                          </a:solidFill>
+                          <a:effectLst/>
+                        </a:rPr>
+                        <a:t>N=119</a:t>
+                      </a:r>
+                      <a:endParaRPr lang="en-US" sz="4400" b="1" i="0" u="none" strike="noStrike" dirty="0">
+                        <a:solidFill>
+                          <a:schemeClr val="tx1"/>
+                        </a:solidFill>
+                        <a:effectLst/>
+                        <a:latin typeface="Gill Sans MT" panose="020B0502020104020203" pitchFamily="34" charset="0"/>
+                      </a:endParaRPr>
+                    </a:p>
+                  </a:txBody>
+                  <a:tcPr marL="9525" marR="9525" marT="9525" marB="0" anchor="b">
+                    <a:lnL w="12700" cmpd="sng">
+                      <a:noFill/>
+                    </a:lnL>
+                    <a:lnR w="12700" cmpd="sng">
+                      <a:noFill/>
+                    </a:lnR>
+                    <a:lnT w="12700" cap="flat" cmpd="sng" algn="ctr">
+                      <a:solidFill>
+                        <a:schemeClr val="tx1"/>
+                      </a:solidFill>
+                      <a:prstDash val="solid"/>
+                      <a:round/>
+                      <a:headEnd type="none" w="med" len="med"/>
+                      <a:tailEnd type="none" w="med" len="med"/>
+                    </a:lnT>
+                    <a:lnB w="12700" cap="flat" cmpd="sng" algn="ctr">
+                      <a:solidFill>
+                        <a:schemeClr val="tx1"/>
+                      </a:solidFill>
+                      <a:prstDash val="solid"/>
+                      <a:round/>
+                      <a:headEnd type="none" w="med" len="med"/>
+                      <a:tailEnd type="none" w="med" len="med"/>
+                    </a:lnB>
+                    <a:lnTlToBr w="12700" cmpd="sng">
+                      <a:noFill/>
+                      <a:prstDash val="solid"/>
+                    </a:lnTlToBr>
+                    <a:lnBlToTr w="12700" cmpd="sng">
+                      <a:noFill/>
+                      <a:prstDash val="solid"/>
+                    </a:lnBlToTr>
+                    <a:solidFill>
+                      <a:schemeClr val="bg1"/>
+                    </a:solidFill>
+                  </a:tcPr>
+                </a:tc>
+              </a:tr>
+              <a:tr h="837824">
+                <a:tc>
+                  <a:txBody>
+                    <a:bodyPr/>
+                    <a:lstStyle/>
+                    <a:p>
+                      <a:pPr algn="ctr" fontAlgn="b"/>
+                      <a:r>
+                        <a:rPr lang="en-US" sz="4400" u="none" strike="noStrike" dirty="0">
+                          <a:effectLst/>
+                        </a:rPr>
+                        <a:t>r = .1 (small)</a:t>
+                      </a:r>
+                      <a:endParaRPr lang="en-US" sz="4400" b="1" i="0" u="none" strike="noStrike" dirty="0">
+                        <a:solidFill>
+                          <a:srgbClr val="000000"/>
+                        </a:solidFill>
+                        <a:effectLst/>
+                        <a:latin typeface="Gill Sans MT" panose="020B0502020104020203" pitchFamily="34" charset="0"/>
+                      </a:endParaRPr>
+                    </a:p>
+                  </a:txBody>
+                  <a:tcPr marL="9525" marR="9525" marT="9525" marB="0" anchor="b">
+                    <a:lnL w="12700" cmpd="sng">
+                      <a:noFill/>
+                    </a:lnL>
+                    <a:lnR w="12700" cmpd="sng">
+                      <a:noFill/>
+                    </a:lnR>
+                    <a:lnT w="12700" cap="flat" cmpd="sng" algn="ctr">
+                      <a:solidFill>
+                        <a:schemeClr val="tx1"/>
+                      </a:solidFill>
+                      <a:prstDash val="solid"/>
+                      <a:round/>
+                      <a:headEnd type="none" w="med" len="med"/>
+                      <a:tailEnd type="none" w="med" len="med"/>
+                    </a:lnT>
+                    <a:lnB w="12700" cmpd="sng">
+                      <a:noFill/>
+                    </a:lnB>
+                    <a:lnTlToBr w="12700" cmpd="sng">
+                      <a:noFill/>
+                      <a:prstDash val="solid"/>
+                    </a:lnTlToBr>
+                    <a:lnBlToTr w="12700" cmpd="sng">
+                      <a:noFill/>
+                      <a:prstDash val="solid"/>
+                    </a:lnBlToTr>
+                    <a:solidFill>
+                      <a:schemeClr val="tx1"/>
+                    </a:solidFill>
+                  </a:tcPr>
+                </a:tc>
+                <a:tc>
+                  <a:txBody>
+                    <a:bodyPr/>
+                    <a:lstStyle/>
+                    <a:p>
+                      <a:pPr algn="ctr" fontAlgn="b"/>
+                      <a:r>
+                        <a:rPr lang="en-US" sz="4400" b="1" i="0" u="none" strike="noStrike" dirty="0" smtClean="0">
+                          <a:solidFill>
+                            <a:srgbClr val="000000"/>
+                          </a:solidFill>
+                          <a:effectLst/>
+                          <a:latin typeface="Gill Sans MT" panose="020B0502020104020203" pitchFamily="34" charset="0"/>
+                        </a:rPr>
+                        <a:t>&gt;50</a:t>
+                      </a:r>
+                      <a:endParaRPr lang="en-US" sz="4400" b="1" i="0" u="none" strike="noStrike" dirty="0">
+                        <a:solidFill>
+                          <a:srgbClr val="000000"/>
+                        </a:solidFill>
+                        <a:effectLst/>
+                        <a:latin typeface="Gill Sans MT" panose="020B0502020104020203" pitchFamily="34" charset="0"/>
+                      </a:endParaRPr>
+                    </a:p>
+                  </a:txBody>
+                  <a:tcPr marL="9525" marR="9525" marT="9525" marB="0" anchor="b">
+                    <a:lnL w="12700" cmpd="sng">
+                      <a:noFill/>
+                    </a:lnL>
+                    <a:lnR w="12700" cmpd="sng">
+                      <a:noFill/>
+                    </a:lnR>
+                    <a:lnT w="12700" cap="flat" cmpd="sng" algn="ctr">
+                      <a:solidFill>
+                        <a:schemeClr val="tx1"/>
+                      </a:solidFill>
+                      <a:prstDash val="solid"/>
+                      <a:round/>
+                      <a:headEnd type="none" w="med" len="med"/>
+                      <a:tailEnd type="none" w="med" len="med"/>
+                    </a:lnT>
+                    <a:lnB w="12700" cmpd="sng">
+                      <a:noFill/>
+                    </a:lnB>
+                    <a:lnTlToBr w="12700" cmpd="sng">
+                      <a:noFill/>
+                      <a:prstDash val="solid"/>
+                    </a:lnTlToBr>
+                    <a:lnBlToTr w="12700" cmpd="sng">
+                      <a:noFill/>
+                      <a:prstDash val="solid"/>
+                    </a:lnBlToTr>
+                    <a:solidFill>
+                      <a:schemeClr val="tx1"/>
+                    </a:solidFill>
+                  </a:tcPr>
+                </a:tc>
+                <a:tc>
+                  <a:txBody>
+                    <a:bodyPr/>
+                    <a:lstStyle/>
+                    <a:p>
+                      <a:pPr algn="ctr" fontAlgn="b"/>
+                      <a:r>
+                        <a:rPr lang="en-US" sz="4400" b="1" i="0" u="none" strike="noStrike" dirty="0" smtClean="0">
+                          <a:solidFill>
+                            <a:srgbClr val="000000"/>
+                          </a:solidFill>
+                          <a:effectLst/>
+                          <a:latin typeface="Gill Sans MT" panose="020B0502020104020203" pitchFamily="34" charset="0"/>
+                        </a:rPr>
+                        <a:t>25</a:t>
+                      </a:r>
+                      <a:endParaRPr lang="en-US" sz="4400" b="1" i="0" u="none" strike="noStrike" dirty="0">
+                        <a:solidFill>
+                          <a:srgbClr val="000000"/>
+                        </a:solidFill>
+                        <a:effectLst/>
+                        <a:latin typeface="Gill Sans MT" panose="020B0502020104020203" pitchFamily="34" charset="0"/>
+                      </a:endParaRPr>
+                    </a:p>
+                  </a:txBody>
+                  <a:tcPr marL="9525" marR="9525" marT="9525" marB="0" anchor="b">
+                    <a:lnL w="12700" cmpd="sng">
+                      <a:noFill/>
+                    </a:lnL>
+                    <a:lnR w="12700" cmpd="sng">
+                      <a:noFill/>
+                    </a:lnR>
+                    <a:lnT w="12700" cap="flat" cmpd="sng" algn="ctr">
+                      <a:solidFill>
+                        <a:schemeClr val="tx1"/>
+                      </a:solidFill>
+                      <a:prstDash val="solid"/>
+                      <a:round/>
+                      <a:headEnd type="none" w="med" len="med"/>
+                      <a:tailEnd type="none" w="med" len="med"/>
+                    </a:lnT>
+                    <a:lnB w="12700" cmpd="sng">
+                      <a:noFill/>
+                    </a:lnB>
+                    <a:lnTlToBr w="12700" cmpd="sng">
+                      <a:noFill/>
+                      <a:prstDash val="solid"/>
+                    </a:lnTlToBr>
+                    <a:lnBlToTr w="12700" cmpd="sng">
+                      <a:noFill/>
+                      <a:prstDash val="solid"/>
+                    </a:lnBlToTr>
+                    <a:solidFill>
+                      <a:schemeClr val="tx1"/>
+                    </a:solidFill>
+                  </a:tcPr>
+                </a:tc>
+                <a:tc>
+                  <a:txBody>
+                    <a:bodyPr/>
+                    <a:lstStyle/>
+                    <a:p>
+                      <a:pPr algn="ctr" fontAlgn="b"/>
+                      <a:r>
+                        <a:rPr lang="en-US" sz="4400" b="1" i="0" u="none" strike="noStrike" dirty="0" smtClean="0">
+                          <a:solidFill>
+                            <a:srgbClr val="000000"/>
+                          </a:solidFill>
+                          <a:effectLst/>
+                          <a:latin typeface="Gill Sans MT" panose="020B0502020104020203" pitchFamily="34" charset="0"/>
+                        </a:rPr>
+                        <a:t>7</a:t>
+                      </a:r>
+                      <a:endParaRPr lang="en-US" sz="4400" b="1" i="0" u="none" strike="noStrike" dirty="0">
+                        <a:solidFill>
+                          <a:srgbClr val="000000"/>
+                        </a:solidFill>
+                        <a:effectLst/>
+                        <a:latin typeface="Gill Sans MT" panose="020B0502020104020203" pitchFamily="34" charset="0"/>
+                      </a:endParaRPr>
+                    </a:p>
+                  </a:txBody>
+                  <a:tcPr marL="9525" marR="9525" marT="9525" marB="0" anchor="b">
+                    <a:lnL w="12700" cmpd="sng">
+                      <a:noFill/>
+                    </a:lnL>
+                    <a:lnR w="12700" cmpd="sng">
+                      <a:noFill/>
+                    </a:lnR>
+                    <a:lnT w="12700" cap="flat" cmpd="sng" algn="ctr">
+                      <a:solidFill>
+                        <a:schemeClr val="tx1"/>
+                      </a:solidFill>
+                      <a:prstDash val="solid"/>
+                      <a:round/>
+                      <a:headEnd type="none" w="med" len="med"/>
+                      <a:tailEnd type="none" w="med" len="med"/>
+                    </a:lnT>
+                    <a:lnB w="12700" cmpd="sng">
+                      <a:noFill/>
+                    </a:lnB>
+                    <a:lnTlToBr w="12700" cmpd="sng">
+                      <a:noFill/>
+                      <a:prstDash val="solid"/>
+                    </a:lnTlToBr>
+                    <a:lnBlToTr w="12700" cmpd="sng">
+                      <a:noFill/>
+                      <a:prstDash val="solid"/>
+                    </a:lnBlToTr>
+                    <a:solidFill>
+                      <a:schemeClr val="tx1"/>
+                    </a:solidFill>
+                  </a:tcPr>
+                </a:tc>
+              </a:tr>
+              <a:tr h="837824">
+                <a:tc>
+                  <a:txBody>
+                    <a:bodyPr/>
+                    <a:lstStyle/>
+                    <a:p>
+                      <a:pPr algn="ctr" fontAlgn="b"/>
+                      <a:r>
+                        <a:rPr lang="en-US" sz="4400" u="none" strike="noStrike" dirty="0">
+                          <a:effectLst/>
+                        </a:rPr>
+                        <a:t>r = </a:t>
+                      </a:r>
+                      <a:r>
+                        <a:rPr lang="en-US" sz="4400" u="none" strike="noStrike" dirty="0" smtClean="0">
+                          <a:effectLst/>
+                        </a:rPr>
+                        <a:t>.25 </a:t>
+                      </a:r>
+                      <a:r>
+                        <a:rPr lang="en-US" sz="4400" u="none" strike="noStrike" dirty="0">
+                          <a:effectLst/>
+                        </a:rPr>
+                        <a:t>(medium)</a:t>
+                      </a:r>
+                      <a:endParaRPr lang="en-US" sz="4400" b="1" i="0" u="none" strike="noStrike" dirty="0">
+                        <a:solidFill>
+                          <a:srgbClr val="000000"/>
+                        </a:solidFill>
+                        <a:effectLst/>
+                        <a:latin typeface="Gill Sans MT" panose="020B0502020104020203" pitchFamily="34" charset="0"/>
+                      </a:endParaRPr>
+                    </a:p>
+                  </a:txBody>
+                  <a:tcPr marL="9525" marR="9525" marT="9525" marB="0" anchor="b">
+                    <a:lnL w="12700" cmpd="sng">
+                      <a:noFill/>
+                    </a:lnL>
+                    <a:lnR w="12700" cmpd="sng">
+                      <a:noFill/>
+                    </a:lnR>
+                    <a:lnT w="12700" cmpd="sng">
+                      <a:noFill/>
+                    </a:lnT>
+                    <a:lnB w="12700" cmpd="sng">
+                      <a:noFill/>
+                    </a:lnB>
+                    <a:lnTlToBr w="12700" cmpd="sng">
+                      <a:noFill/>
+                      <a:prstDash val="solid"/>
+                    </a:lnTlToBr>
+                    <a:lnBlToTr w="12700" cmpd="sng">
+                      <a:noFill/>
+                      <a:prstDash val="solid"/>
+                    </a:lnBlToTr>
+                    <a:solidFill>
+                      <a:schemeClr val="tx1"/>
+                    </a:solidFill>
+                  </a:tcPr>
+                </a:tc>
+                <a:tc>
+                  <a:txBody>
+                    <a:bodyPr/>
+                    <a:lstStyle/>
+                    <a:p>
+                      <a:pPr algn="ctr" fontAlgn="b"/>
+                      <a:r>
+                        <a:rPr lang="en-US" sz="4400" b="1" i="0" u="none" strike="noStrike" dirty="0" smtClean="0">
+                          <a:solidFill>
+                            <a:srgbClr val="000000"/>
+                          </a:solidFill>
+                          <a:effectLst/>
+                          <a:latin typeface="Gill Sans MT" panose="020B0502020104020203" pitchFamily="34" charset="0"/>
+                        </a:rPr>
+                        <a:t>3</a:t>
+                      </a:r>
+                      <a:endParaRPr lang="en-US" sz="4400" b="1" i="0" u="none" strike="noStrike" dirty="0">
+                        <a:solidFill>
+                          <a:srgbClr val="000000"/>
+                        </a:solidFill>
+                        <a:effectLst/>
+                        <a:latin typeface="Gill Sans MT" panose="020B0502020104020203" pitchFamily="34" charset="0"/>
+                      </a:endParaRPr>
+                    </a:p>
+                  </a:txBody>
+                  <a:tcPr marL="9525" marR="9525" marT="9525" marB="0" anchor="b">
+                    <a:lnL w="12700" cmpd="sng">
+                      <a:noFill/>
+                    </a:lnL>
+                    <a:lnR w="12700" cmpd="sng">
+                      <a:noFill/>
+                    </a:lnR>
+                    <a:lnT w="12700" cmpd="sng">
+                      <a:noFill/>
+                    </a:lnT>
+                    <a:lnB w="12700" cmpd="sng">
+                      <a:noFill/>
+                    </a:lnB>
+                    <a:lnTlToBr w="12700" cmpd="sng">
+                      <a:noFill/>
+                      <a:prstDash val="solid"/>
+                    </a:lnTlToBr>
+                    <a:lnBlToTr w="12700" cmpd="sng">
+                      <a:noFill/>
+                      <a:prstDash val="solid"/>
+                    </a:lnBlToTr>
+                    <a:solidFill>
+                      <a:schemeClr val="tx1"/>
+                    </a:solidFill>
+                  </a:tcPr>
+                </a:tc>
+                <a:tc>
+                  <a:txBody>
+                    <a:bodyPr/>
+                    <a:lstStyle/>
+                    <a:p>
+                      <a:pPr algn="ctr" fontAlgn="b"/>
+                      <a:r>
+                        <a:rPr lang="en-US" sz="4400" b="1" i="0" u="none" strike="noStrike" dirty="0" smtClean="0">
+                          <a:solidFill>
+                            <a:srgbClr val="000000"/>
+                          </a:solidFill>
+                          <a:effectLst/>
+                          <a:latin typeface="Gill Sans MT" panose="020B0502020104020203" pitchFamily="34" charset="0"/>
+                        </a:rPr>
+                        <a:t>1</a:t>
+                      </a:r>
+                      <a:endParaRPr lang="en-US" sz="4400" b="1" i="0" u="none" strike="noStrike" dirty="0">
+                        <a:solidFill>
+                          <a:srgbClr val="000000"/>
+                        </a:solidFill>
+                        <a:effectLst/>
+                        <a:latin typeface="Gill Sans MT" panose="020B0502020104020203" pitchFamily="34" charset="0"/>
+                      </a:endParaRPr>
+                    </a:p>
+                  </a:txBody>
+                  <a:tcPr marL="9525" marR="9525" marT="9525" marB="0" anchor="b">
+                    <a:lnL w="12700" cmpd="sng">
+                      <a:noFill/>
+                    </a:lnL>
+                    <a:lnR w="12700" cmpd="sng">
+                      <a:noFill/>
+                    </a:lnR>
+                    <a:lnT w="12700" cmpd="sng">
+                      <a:noFill/>
+                    </a:lnT>
+                    <a:lnB w="12700" cmpd="sng">
+                      <a:noFill/>
+                    </a:lnB>
+                    <a:lnTlToBr w="12700" cmpd="sng">
+                      <a:noFill/>
+                      <a:prstDash val="solid"/>
+                    </a:lnTlToBr>
+                    <a:lnBlToTr w="12700" cmpd="sng">
+                      <a:noFill/>
+                      <a:prstDash val="solid"/>
+                    </a:lnBlToTr>
+                    <a:solidFill>
+                      <a:schemeClr val="tx1"/>
+                    </a:solidFill>
+                  </a:tcPr>
+                </a:tc>
+                <a:tc>
+                  <a:txBody>
+                    <a:bodyPr/>
+                    <a:lstStyle/>
+                    <a:p>
+                      <a:pPr algn="ctr" fontAlgn="b"/>
+                      <a:r>
+                        <a:rPr lang="en-US" sz="4400" b="1" i="0" u="none" strike="noStrike" dirty="0" smtClean="0">
+                          <a:solidFill>
+                            <a:srgbClr val="000000"/>
+                          </a:solidFill>
+                          <a:effectLst/>
+                          <a:latin typeface="Gill Sans MT" panose="020B0502020104020203" pitchFamily="34" charset="0"/>
+                        </a:rPr>
+                        <a:t>1</a:t>
+                      </a:r>
+                      <a:endParaRPr lang="en-US" sz="4400" b="1" i="0" u="none" strike="noStrike" dirty="0">
+                        <a:solidFill>
+                          <a:srgbClr val="000000"/>
+                        </a:solidFill>
+                        <a:effectLst/>
+                        <a:latin typeface="Gill Sans MT" panose="020B0502020104020203" pitchFamily="34" charset="0"/>
+                      </a:endParaRPr>
+                    </a:p>
+                  </a:txBody>
+                  <a:tcPr marL="9525" marR="9525" marT="9525" marB="0" anchor="b">
+                    <a:lnL w="12700" cmpd="sng">
+                      <a:noFill/>
+                    </a:lnL>
+                    <a:lnR w="12700" cmpd="sng">
+                      <a:noFill/>
+                    </a:lnR>
+                    <a:lnT w="12700" cmpd="sng">
+                      <a:noFill/>
+                    </a:lnT>
+                    <a:lnB w="12700" cmpd="sng">
+                      <a:noFill/>
+                    </a:lnB>
+                    <a:lnTlToBr w="12700" cmpd="sng">
+                      <a:noFill/>
+                      <a:prstDash val="solid"/>
+                    </a:lnTlToBr>
+                    <a:lnBlToTr w="12700" cmpd="sng">
+                      <a:noFill/>
+                      <a:prstDash val="solid"/>
+                    </a:lnBlToTr>
+                    <a:solidFill>
+                      <a:schemeClr val="tx1"/>
+                    </a:solidFill>
+                  </a:tcPr>
+                </a:tc>
+              </a:tr>
+              <a:tr h="837824">
+                <a:tc>
+                  <a:txBody>
+                    <a:bodyPr/>
+                    <a:lstStyle/>
+                    <a:p>
+                      <a:pPr algn="ctr" fontAlgn="b"/>
+                      <a:r>
+                        <a:rPr lang="en-US" sz="4400" u="none" strike="noStrike" dirty="0">
+                          <a:effectLst/>
+                        </a:rPr>
+                        <a:t>r = </a:t>
+                      </a:r>
+                      <a:r>
+                        <a:rPr lang="en-US" sz="4400" u="none" strike="noStrike" dirty="0" smtClean="0">
+                          <a:effectLst/>
+                        </a:rPr>
+                        <a:t>.5 </a:t>
+                      </a:r>
+                      <a:r>
+                        <a:rPr lang="en-US" sz="4400" u="none" strike="noStrike" dirty="0">
+                          <a:effectLst/>
+                        </a:rPr>
+                        <a:t>(strong)</a:t>
+                      </a:r>
+                      <a:endParaRPr lang="en-US" sz="4400" b="1" i="0" u="none" strike="noStrike" dirty="0">
+                        <a:solidFill>
+                          <a:srgbClr val="000000"/>
+                        </a:solidFill>
+                        <a:effectLst/>
+                        <a:latin typeface="Gill Sans MT" panose="020B0502020104020203" pitchFamily="34" charset="0"/>
+                      </a:endParaRPr>
+                    </a:p>
+                  </a:txBody>
+                  <a:tcPr marL="9525" marR="9525" marT="9525" marB="0" anchor="b">
+                    <a:lnL w="12700" cmpd="sng">
+                      <a:noFill/>
+                    </a:lnL>
+                    <a:lnR w="12700" cmpd="sng">
+                      <a:noFill/>
+                    </a:lnR>
+                    <a:lnT w="12700" cmpd="sng">
+                      <a:noFill/>
+                    </a:lnT>
+                    <a:lnB w="12700" cmpd="sng">
+                      <a:noFill/>
+                    </a:lnB>
+                    <a:lnTlToBr w="12700" cmpd="sng">
+                      <a:noFill/>
+                      <a:prstDash val="solid"/>
+                    </a:lnTlToBr>
+                    <a:lnBlToTr w="12700" cmpd="sng">
+                      <a:noFill/>
+                      <a:prstDash val="solid"/>
+                    </a:lnBlToTr>
+                    <a:solidFill>
+                      <a:schemeClr val="tx1"/>
+                    </a:solidFill>
+                  </a:tcPr>
+                </a:tc>
+                <a:tc>
+                  <a:txBody>
+                    <a:bodyPr/>
+                    <a:lstStyle/>
+                    <a:p>
+                      <a:pPr algn="ctr" fontAlgn="b"/>
+                      <a:r>
+                        <a:rPr lang="en-US" sz="4400" b="1" u="none" strike="noStrike" dirty="0" smtClean="0">
+                          <a:effectLst/>
+                          <a:latin typeface="Gill Sans MT" panose="020B0502020104020203" pitchFamily="34" charset="0"/>
+                        </a:rPr>
+                        <a:t>1</a:t>
+                      </a:r>
+                      <a:r>
+                        <a:rPr lang="en-US" sz="4400" u="none" strike="noStrike" dirty="0">
+                          <a:effectLst/>
+                          <a:latin typeface="Gill Sans MT" panose="020B0502020104020203" pitchFamily="34" charset="0"/>
+                        </a:rPr>
+                        <a:t> </a:t>
+                      </a:r>
+                      <a:endParaRPr lang="en-US" sz="4400" b="1" i="0" u="none" strike="noStrike" dirty="0">
+                        <a:solidFill>
+                          <a:srgbClr val="000000"/>
+                        </a:solidFill>
+                        <a:effectLst/>
+                        <a:latin typeface="Gill Sans MT" panose="020B0502020104020203" pitchFamily="34" charset="0"/>
+                      </a:endParaRPr>
+                    </a:p>
+                  </a:txBody>
+                  <a:tcPr marL="9525" marR="9525" marT="9525" marB="0" anchor="b">
+                    <a:lnL w="12700" cmpd="sng">
+                      <a:noFill/>
+                    </a:lnL>
+                    <a:lnR w="12700" cmpd="sng">
+                      <a:noFill/>
+                    </a:lnR>
+                    <a:lnT w="12700" cmpd="sng">
+                      <a:noFill/>
+                    </a:lnT>
+                    <a:lnB w="12700" cmpd="sng">
+                      <a:noFill/>
+                    </a:lnB>
+                    <a:lnTlToBr w="12700" cmpd="sng">
+                      <a:noFill/>
+                      <a:prstDash val="solid"/>
+                    </a:lnTlToBr>
+                    <a:lnBlToTr w="12700" cmpd="sng">
+                      <a:noFill/>
+                      <a:prstDash val="solid"/>
+                    </a:lnBlToTr>
+                    <a:solidFill>
+                      <a:schemeClr val="tx1"/>
+                    </a:solidFill>
+                  </a:tcPr>
+                </a:tc>
+                <a:tc>
+                  <a:txBody>
+                    <a:bodyPr/>
+                    <a:lstStyle/>
+                    <a:p>
+                      <a:pPr algn="ctr" fontAlgn="b"/>
+                      <a:r>
+                        <a:rPr lang="en-US" sz="4400" b="1" u="none" strike="noStrike" dirty="0">
+                          <a:effectLst/>
+                          <a:latin typeface="Gill Sans MT" panose="020B0502020104020203" pitchFamily="34" charset="0"/>
+                        </a:rPr>
+                        <a:t> </a:t>
+                      </a:r>
+                      <a:r>
+                        <a:rPr lang="en-US" sz="4400" b="1" u="none" strike="noStrike" dirty="0" smtClean="0">
+                          <a:effectLst/>
+                          <a:latin typeface="Gill Sans MT" panose="020B0502020104020203" pitchFamily="34" charset="0"/>
+                        </a:rPr>
+                        <a:t>1</a:t>
+                      </a:r>
+                      <a:endParaRPr lang="en-US" sz="4400" b="1" i="0" u="none" strike="noStrike" dirty="0">
+                        <a:solidFill>
+                          <a:srgbClr val="000000"/>
+                        </a:solidFill>
+                        <a:effectLst/>
+                        <a:latin typeface="Gill Sans MT" panose="020B0502020104020203" pitchFamily="34" charset="0"/>
+                      </a:endParaRPr>
+                    </a:p>
+                  </a:txBody>
+                  <a:tcPr marL="9525" marR="9525" marT="9525" marB="0" anchor="b">
+                    <a:lnL w="12700" cmpd="sng">
+                      <a:noFill/>
+                    </a:lnL>
+                    <a:lnR w="12700" cmpd="sng">
+                      <a:noFill/>
+                    </a:lnR>
+                    <a:lnT w="12700" cmpd="sng">
+                      <a:noFill/>
+                    </a:lnT>
+                    <a:lnB w="12700" cmpd="sng">
+                      <a:noFill/>
+                    </a:lnB>
+                    <a:lnTlToBr w="12700" cmpd="sng">
+                      <a:noFill/>
+                      <a:prstDash val="solid"/>
+                    </a:lnTlToBr>
+                    <a:lnBlToTr w="12700" cmpd="sng">
+                      <a:noFill/>
+                      <a:prstDash val="solid"/>
+                    </a:lnBlToTr>
+                    <a:solidFill>
+                      <a:schemeClr val="tx1"/>
+                    </a:solidFill>
+                  </a:tcPr>
+                </a:tc>
+                <a:tc>
+                  <a:txBody>
+                    <a:bodyPr/>
+                    <a:lstStyle/>
+                    <a:p>
+                      <a:pPr algn="ctr" fontAlgn="b"/>
+                      <a:r>
+                        <a:rPr lang="en-US" sz="4400" b="1" u="none" strike="noStrike" dirty="0">
+                          <a:effectLst/>
+                          <a:latin typeface="Gill Sans MT" panose="020B0502020104020203" pitchFamily="34" charset="0"/>
+                        </a:rPr>
+                        <a:t> </a:t>
+                      </a:r>
+                      <a:r>
+                        <a:rPr lang="en-US" sz="4400" b="1" u="none" strike="noStrike" dirty="0" smtClean="0">
+                          <a:effectLst/>
+                          <a:latin typeface="Gill Sans MT" panose="020B0502020104020203" pitchFamily="34" charset="0"/>
+                        </a:rPr>
+                        <a:t>1</a:t>
+                      </a:r>
+                      <a:endParaRPr lang="en-US" sz="4400" b="1" i="0" u="none" strike="noStrike" dirty="0">
+                        <a:solidFill>
+                          <a:srgbClr val="000000"/>
+                        </a:solidFill>
+                        <a:effectLst/>
+                        <a:latin typeface="Gill Sans MT" panose="020B0502020104020203" pitchFamily="34" charset="0"/>
+                      </a:endParaRPr>
+                    </a:p>
+                  </a:txBody>
+                  <a:tcPr marL="9525" marR="9525" marT="9525" marB="0" anchor="b">
+                    <a:lnL w="12700" cmpd="sng">
+                      <a:noFill/>
+                    </a:lnL>
+                    <a:lnR w="12700" cmpd="sng">
+                      <a:noFill/>
+                    </a:lnR>
+                    <a:lnT w="12700" cmpd="sng">
+                      <a:noFill/>
+                    </a:lnT>
+                    <a:lnB w="12700" cmpd="sng">
+                      <a:noFill/>
+                    </a:lnB>
+                    <a:lnTlToBr w="12700" cmpd="sng">
+                      <a:noFill/>
+                      <a:prstDash val="solid"/>
+                    </a:lnTlToBr>
+                    <a:lnBlToTr w="12700" cmpd="sng">
+                      <a:noFill/>
+                      <a:prstDash val="solid"/>
+                    </a:lnBlToTr>
+                    <a:solidFill>
+                      <a:schemeClr val="tx1"/>
+                    </a:solidFill>
+                  </a:tcPr>
+                </a:tc>
+              </a:tr>
+            </a:tbl>
+          </a:graphicData>
+        </a:graphic>
+      </p:graphicFrame>
+      <p:sp>
+        <p:nvSpPr>
+          <p:cNvPr id="21" name="TextBox 20"/>
+          <p:cNvSpPr txBox="1"/>
+          <p:nvPr/>
+        </p:nvSpPr>
+        <p:spPr>
+          <a:xfrm>
+            <a:off x="16411287" y="31015054"/>
+            <a:ext cx="11474246" cy="1938992"/>
+          </a:xfrm>
+          <a:prstGeom prst="rect">
+            <a:avLst/>
+          </a:prstGeom>
+          <a:noFill/>
+        </p:spPr>
+        <p:txBody>
+          <a:bodyPr wrap="square" rtlCol="0">
+            <a:spAutoFit/>
+          </a:bodyPr>
+          <a:lstStyle/>
+          <a:p>
+            <a:pPr algn="ctr"/>
+            <a:r>
+              <a:rPr lang="en-US" sz="6000" dirty="0" smtClean="0">
+                <a:latin typeface="Gill Sans MT" panose="020B0502020104020203" pitchFamily="34" charset="0"/>
+              </a:rPr>
+              <a:t>Application 2 – nonsignificant replications in RPP</a:t>
+            </a:r>
+            <a:endParaRPr lang="en-US" sz="4800" dirty="0">
+              <a:latin typeface="Gill Sans MT" panose="020B0502020104020203" pitchFamily="34" charset="0"/>
+            </a:endParaRPr>
+          </a:p>
+        </p:txBody>
+      </p:sp>
+      <p:sp>
+        <p:nvSpPr>
+          <p:cNvPr id="25" name="TextBox 24"/>
+          <p:cNvSpPr txBox="1"/>
+          <p:nvPr/>
+        </p:nvSpPr>
+        <p:spPr>
+          <a:xfrm>
+            <a:off x="15375823" y="33218602"/>
+            <a:ext cx="12755424" cy="5016758"/>
+          </a:xfrm>
+          <a:prstGeom prst="rect">
+            <a:avLst/>
+          </a:prstGeom>
+          <a:noFill/>
+        </p:spPr>
+        <p:txBody>
+          <a:bodyPr wrap="square" rtlCol="0">
+            <a:spAutoFit/>
+          </a:bodyPr>
+          <a:lstStyle/>
+          <a:p>
+            <a:pPr marL="857250" indent="-857250" algn="just">
+              <a:buFont typeface="Arial" panose="020B0604020202020204" pitchFamily="34" charset="0"/>
+              <a:buChar char="•"/>
+            </a:pPr>
+            <a:r>
+              <a:rPr lang="en-US" sz="4000" dirty="0" smtClean="0">
+                <a:latin typeface="Gill Sans MT" panose="020B0502020104020203" pitchFamily="34" charset="0"/>
+              </a:rPr>
+              <a:t>Of the 100 replications, 64 statistically nonsignificant</a:t>
+            </a:r>
+          </a:p>
+          <a:p>
+            <a:pPr marL="857250" indent="-857250" algn="just">
+              <a:buFont typeface="Arial" panose="020B0604020202020204" pitchFamily="34" charset="0"/>
+              <a:buChar char="•"/>
+            </a:pPr>
+            <a:r>
+              <a:rPr lang="en-US" sz="4000" dirty="0" smtClean="0">
+                <a:latin typeface="Gill Sans MT" panose="020B0502020104020203" pitchFamily="34" charset="0"/>
+              </a:rPr>
+              <a:t>Of the 63 with test statistics, what would be the 95% confidence interval of false negatives when imposing a small, medium, or strong population effect?</a:t>
+            </a:r>
+          </a:p>
+          <a:p>
+            <a:pPr marL="857250" indent="-857250" algn="just">
+              <a:buFont typeface="Arial" panose="020B0604020202020204" pitchFamily="34" charset="0"/>
+              <a:buChar char="•"/>
+            </a:pPr>
+            <a:r>
+              <a:rPr lang="en-US" sz="4000" dirty="0" smtClean="0">
+                <a:latin typeface="Gill Sans MT" panose="020B0502020104020203" pitchFamily="34" charset="0"/>
+              </a:rPr>
+              <a:t>Small (r = .1) </a:t>
+            </a:r>
+            <a:r>
+              <a:rPr lang="en-US" sz="4000" dirty="0" smtClean="0">
+                <a:latin typeface="Gill Sans MT" panose="020B0502020104020203" pitchFamily="34" charset="0"/>
+                <a:sym typeface="Wingdings" panose="05000000000000000000" pitchFamily="2" charset="2"/>
+              </a:rPr>
+              <a:t> 0-63 false negatives</a:t>
+            </a:r>
+          </a:p>
+          <a:p>
+            <a:pPr marL="857250" indent="-857250" algn="just">
+              <a:buFont typeface="Arial" panose="020B0604020202020204" pitchFamily="34" charset="0"/>
+              <a:buChar char="•"/>
+            </a:pPr>
+            <a:r>
+              <a:rPr lang="en-US" sz="4000" dirty="0" smtClean="0">
+                <a:latin typeface="Gill Sans MT" panose="020B0502020104020203" pitchFamily="34" charset="0"/>
+                <a:sym typeface="Wingdings" panose="05000000000000000000" pitchFamily="2" charset="2"/>
+              </a:rPr>
+              <a:t>Medium (r = .3)  0-21 false negatives</a:t>
+            </a:r>
+          </a:p>
+          <a:p>
+            <a:pPr marL="857250" indent="-857250" algn="just">
+              <a:buFont typeface="Arial" panose="020B0604020202020204" pitchFamily="34" charset="0"/>
+              <a:buChar char="•"/>
+            </a:pPr>
+            <a:r>
+              <a:rPr lang="en-US" sz="4000" dirty="0" smtClean="0">
+                <a:latin typeface="Gill Sans MT" panose="020B0502020104020203" pitchFamily="34" charset="0"/>
+                <a:sym typeface="Wingdings" panose="05000000000000000000" pitchFamily="2" charset="2"/>
+              </a:rPr>
+              <a:t>Strong (r = .5)  0-13 false negatives</a:t>
+            </a:r>
+          </a:p>
+          <a:p>
+            <a:pPr marL="857250" indent="-857250" algn="just">
+              <a:buFont typeface="Arial" panose="020B0604020202020204" pitchFamily="34" charset="0"/>
+              <a:buChar char="•"/>
+            </a:pPr>
+            <a:endParaRPr lang="en-US" sz="4000" dirty="0">
+              <a:latin typeface="Gill Sans MT" panose="020B0502020104020203" pitchFamily="34" charset="0"/>
+            </a:endParaRPr>
           </a:p>
         </p:txBody>
       </p:sp>
       <p:pic>
         <p:nvPicPr>
-          <p:cNvPr id="19" name="Picture 18"/>
+          <p:cNvPr id="5" name="Picture 4"/>
           <p:cNvPicPr>
             <a:picLocks noChangeAspect="1"/>
           </p:cNvPicPr>
           <p:nvPr/>
         </p:nvPicPr>
         <p:blipFill>
-          <a:blip r:embed="rId7">
+          <a:blip r:embed="rId6">
             <a:extLst>
               <a:ext uri="{28A0092B-C50C-407E-A947-70E740481C1C}">
                 <a14:useLocalDpi xmlns:a14="http://schemas.microsoft.com/office/drawing/2010/main" val="0"/>
@@ -9091,14 +9894,51 @@
         </p:blipFill>
         <p:spPr>
           <a:xfrm>
-            <a:off x="1712755" y="26221103"/>
-            <a:ext cx="9960011" cy="11382869"/>
+            <a:off x="17911682" y="21482147"/>
+            <a:ext cx="8473456" cy="7262962"/>
           </a:xfrm>
           <a:prstGeom prst="rect">
             <a:avLst/>
           </a:prstGeom>
         </p:spPr>
       </p:pic>
+      <p:sp>
+        <p:nvSpPr>
+          <p:cNvPr id="26" name="TextBox 25"/>
+          <p:cNvSpPr txBox="1"/>
+          <p:nvPr/>
+        </p:nvSpPr>
+        <p:spPr>
+          <a:xfrm>
+            <a:off x="15516902" y="28952374"/>
+            <a:ext cx="13748669" cy="1569660"/>
+          </a:xfrm>
+          <a:prstGeom prst="rect">
+            <a:avLst/>
+          </a:prstGeom>
+          <a:noFill/>
+        </p:spPr>
+        <p:txBody>
+          <a:bodyPr wrap="square" rtlCol="0">
+            <a:spAutoFit/>
+          </a:bodyPr>
+          <a:lstStyle/>
+          <a:p>
+            <a:r>
+              <a:rPr lang="en-US" sz="3200" i="1" dirty="0"/>
+              <a:t>Figure </a:t>
+            </a:r>
+            <a:r>
+              <a:rPr lang="en-US" sz="3200" i="1" dirty="0" smtClean="0"/>
+              <a:t>2. </a:t>
+            </a:r>
+            <a:r>
+              <a:rPr lang="en-US" sz="3200" dirty="0"/>
+              <a:t>Sample size development throughout 1985-2013, based on degrees of freedom across 258,050 test results. P25 = 25th percentile. P50 = 50th percentile (i.e., median). P75 = 75th percentile.</a:t>
+            </a:r>
+          </a:p>
+        </p:txBody>
+      </p:sp>
     </p:spTree>
     <p:extLst>
       <p:ext uri="{BB962C8B-B14F-4D97-AF65-F5344CB8AC3E}">
@@ -9109,6 +9949,13 @@
   <p:clrMapOvr>
     <a:masterClrMapping/>
   </p:clrMapOvr>
+  <p:timing>
+    <p:tnLst>
+      <p:par>
+        <p:cTn id="1" dur="indefinite" restart="never" nodeType="tmRoot"/>
+      </p:par>
+    </p:tnLst>
+  </p:timing>
 </p:sld>
 </file>
 

</xml_diff>